<commit_message>
Images updated with the ppts
</commit_message>
<xml_diff>
--- a/Neo4j/Future Unleashed_Neo4j.pptx
+++ b/Neo4j/Future Unleashed_Neo4j.pptx
@@ -2106,7 +2106,7 @@
           <a:p>
             <a:fld id="{CCE70BC5-5967-46F5-B959-0187FC8CE82A}" type="datetimeFigureOut">
               <a:rPr lang="en-US" smtClean="0"/>
-              <a:t>11/2/2015</a:t>
+              <a:t>11/4/2015</a:t>
             </a:fld>
             <a:endParaRPr lang="en-US"/>
           </a:p>
@@ -4968,7 +4968,7 @@
           <a:p>
             <a:fld id="{615B8220-D6CE-4EBA-9DF4-44184996CC87}" type="datetimeFigureOut">
               <a:rPr lang="en-IN" smtClean="0"/>
-              <a:t>02-11-2015</a:t>
+              <a:t>04-11-2015</a:t>
             </a:fld>
             <a:endParaRPr lang="en-IN"/>
           </a:p>
@@ -5221,7 +5221,7 @@
           <a:p>
             <a:fld id="{615B8220-D6CE-4EBA-9DF4-44184996CC87}" type="datetimeFigureOut">
               <a:rPr lang="en-IN" smtClean="0"/>
-              <a:t>02-11-2015</a:t>
+              <a:t>04-11-2015</a:t>
             </a:fld>
             <a:endParaRPr lang="en-IN"/>
           </a:p>
@@ -5391,7 +5391,7 @@
           <a:p>
             <a:fld id="{615B8220-D6CE-4EBA-9DF4-44184996CC87}" type="datetimeFigureOut">
               <a:rPr lang="en-IN" smtClean="0"/>
-              <a:t>02-11-2015</a:t>
+              <a:t>04-11-2015</a:t>
             </a:fld>
             <a:endParaRPr lang="en-IN"/>
           </a:p>
@@ -5571,7 +5571,7 @@
           <a:p>
             <a:fld id="{615B8220-D6CE-4EBA-9DF4-44184996CC87}" type="datetimeFigureOut">
               <a:rPr lang="en-IN" smtClean="0"/>
-              <a:t>02-11-2015</a:t>
+              <a:t>04-11-2015</a:t>
             </a:fld>
             <a:endParaRPr lang="en-IN"/>
           </a:p>
@@ -5793,7 +5793,7 @@
           <a:p>
             <a:fld id="{615B8220-D6CE-4EBA-9DF4-44184996CC87}" type="datetimeFigureOut">
               <a:rPr lang="en-IN" smtClean="0"/>
-              <a:t>02-11-2015</a:t>
+              <a:t>04-11-2015</a:t>
             </a:fld>
             <a:endParaRPr lang="en-IN"/>
           </a:p>
@@ -5993,7 +5993,7 @@
           <a:p>
             <a:fld id="{615B8220-D6CE-4EBA-9DF4-44184996CC87}" type="datetimeFigureOut">
               <a:rPr lang="en-IN" smtClean="0"/>
-              <a:t>02-11-2015</a:t>
+              <a:t>04-11-2015</a:t>
             </a:fld>
             <a:endParaRPr lang="en-IN"/>
           </a:p>
@@ -6253,7 +6253,7 @@
           <a:p>
             <a:fld id="{615B8220-D6CE-4EBA-9DF4-44184996CC87}" type="datetimeFigureOut">
               <a:rPr lang="en-IN" smtClean="0"/>
-              <a:t>02-11-2015</a:t>
+              <a:t>04-11-2015</a:t>
             </a:fld>
             <a:endParaRPr lang="en-IN"/>
           </a:p>
@@ -6529,7 +6529,7 @@
           <a:p>
             <a:fld id="{615B8220-D6CE-4EBA-9DF4-44184996CC87}" type="datetimeFigureOut">
               <a:rPr lang="en-IN" smtClean="0"/>
-              <a:t>02-11-2015</a:t>
+              <a:t>04-11-2015</a:t>
             </a:fld>
             <a:endParaRPr lang="en-IN"/>
           </a:p>
@@ -6761,7 +6761,7 @@
           <a:p>
             <a:fld id="{615B8220-D6CE-4EBA-9DF4-44184996CC87}" type="datetimeFigureOut">
               <a:rPr lang="en-IN" smtClean="0"/>
-              <a:t>02-11-2015</a:t>
+              <a:t>04-11-2015</a:t>
             </a:fld>
             <a:endParaRPr lang="en-IN"/>
           </a:p>
@@ -7128,7 +7128,7 @@
           <a:p>
             <a:fld id="{615B8220-D6CE-4EBA-9DF4-44184996CC87}" type="datetimeFigureOut">
               <a:rPr lang="en-IN" smtClean="0"/>
-              <a:t>02-11-2015</a:t>
+              <a:t>04-11-2015</a:t>
             </a:fld>
             <a:endParaRPr lang="en-IN"/>
           </a:p>
@@ -7246,7 +7246,7 @@
           <a:p>
             <a:fld id="{615B8220-D6CE-4EBA-9DF4-44184996CC87}" type="datetimeFigureOut">
               <a:rPr lang="en-IN" smtClean="0"/>
-              <a:t>02-11-2015</a:t>
+              <a:t>04-11-2015</a:t>
             </a:fld>
             <a:endParaRPr lang="en-IN"/>
           </a:p>
@@ -7341,7 +7341,7 @@
           <a:p>
             <a:fld id="{615B8220-D6CE-4EBA-9DF4-44184996CC87}" type="datetimeFigureOut">
               <a:rPr lang="en-IN" smtClean="0"/>
-              <a:t>02-11-2015</a:t>
+              <a:t>04-11-2015</a:t>
             </a:fld>
             <a:endParaRPr lang="en-IN"/>
           </a:p>
@@ -7978,7 +7978,7 @@
           <a:p>
             <a:fld id="{615B8220-D6CE-4EBA-9DF4-44184996CC87}" type="datetimeFigureOut">
               <a:rPr lang="en-IN" smtClean="0"/>
-              <a:t>02-11-2015</a:t>
+              <a:t>04-11-2015</a:t>
             </a:fld>
             <a:endParaRPr lang="en-IN"/>
           </a:p>
@@ -8789,8 +8789,14 @@
                   </a:solidFill>
                   <a:latin typeface="Segoe UI Light"/>
                 </a:rPr>
-                <a:t>Evangelist</a:t>
+                <a:t>Evangelist (OSS)</a:t>
               </a:r>
+              <a:endParaRPr lang="en-US" sz="2000" dirty="0" smtClean="0">
+                <a:solidFill>
+                  <a:schemeClr val="bg1"/>
+                </a:solidFill>
+                <a:latin typeface="Segoe UI Light"/>
+              </a:endParaRPr>
             </a:p>
             <a:p>
               <a:pPr>
@@ -8920,11 +8926,11 @@
   <p:clrMapOvr>
     <a:masterClrMapping/>
   </p:clrMapOvr>
-  <mc:AlternateContent xmlns:mc="http://schemas.openxmlformats.org/markup-compatibility/2006">
-    <mc:Choice xmlns:p14="http://schemas.microsoft.com/office/powerpoint/2010/main" Requires="p14">
+  <mc:AlternateContent xmlns:mc="http://schemas.openxmlformats.org/markup-compatibility/2006" xmlns:p14="http://schemas.microsoft.com/office/powerpoint/2010/main">
+    <mc:Choice Requires="p14">
       <p:transition spd="slow" p14:dur="2000" advTm="21361"/>
     </mc:Choice>
-    <mc:Fallback>
+    <mc:Fallback xmlns="">
       <p:transition spd="slow" advTm="21361"/>
     </mc:Fallback>
   </mc:AlternateContent>
@@ -9380,11 +9386,11 @@
   <p:clrMapOvr>
     <a:masterClrMapping/>
   </p:clrMapOvr>
-  <mc:AlternateContent xmlns:mc="http://schemas.openxmlformats.org/markup-compatibility/2006">
-    <mc:Choice xmlns:p14="http://schemas.microsoft.com/office/powerpoint/2010/main" Requires="p14">
+  <mc:AlternateContent xmlns:mc="http://schemas.openxmlformats.org/markup-compatibility/2006" xmlns:p14="http://schemas.microsoft.com/office/powerpoint/2010/main">
+    <mc:Choice Requires="p14">
       <p:transition spd="slow" p14:dur="2000" advTm="5635"/>
     </mc:Choice>
-    <mc:Fallback>
+    <mc:Fallback xmlns="">
       <p:transition spd="slow" advTm="5635"/>
     </mc:Fallback>
   </mc:AlternateContent>
@@ -9449,11 +9455,11 @@
   <p:clrMapOvr>
     <a:masterClrMapping/>
   </p:clrMapOvr>
-  <mc:AlternateContent xmlns:mc="http://schemas.openxmlformats.org/markup-compatibility/2006">
-    <mc:Choice xmlns:p14="http://schemas.microsoft.com/office/powerpoint/2010/main" Requires="p14">
+  <mc:AlternateContent xmlns:mc="http://schemas.openxmlformats.org/markup-compatibility/2006" xmlns:p14="http://schemas.microsoft.com/office/powerpoint/2010/main">
+    <mc:Choice Requires="p14">
       <p:transition spd="slow" p14:dur="2000" advTm="83171"/>
     </mc:Choice>
-    <mc:Fallback>
+    <mc:Fallback xmlns="">
       <p:transition spd="slow" advTm="83171"/>
     </mc:Fallback>
   </mc:AlternateContent>
@@ -9506,16 +9512,7 @@
                 </a:solidFill>
                 <a:latin typeface="Segoe UI Light" panose="020B0502040204020203" pitchFamily="34" charset="0"/>
               </a:rPr>
-              <a:t>Neo4J </a:t>
-            </a:r>
-            <a:r>
-              <a:rPr lang="en-US" dirty="0" smtClean="0">
-                <a:solidFill>
-                  <a:srgbClr val="00B0F0"/>
-                </a:solidFill>
-                <a:latin typeface="Segoe UI Light" panose="020B0502040204020203" pitchFamily="34" charset="0"/>
-              </a:rPr>
-              <a:t>Installation – Local Machine</a:t>
+              <a:t>Neo4J Installation – Local Machine</a:t>
             </a:r>
             <a:endParaRPr lang="en-US" dirty="0"/>
           </a:p>
@@ -9593,14 +9590,7 @@
                 <a:latin typeface="Segoe UI Light" panose="020B0502040204020203" pitchFamily="34" charset="0"/>
                 <a:cs typeface="Segoe UI Light" panose="020B0502040204020203" pitchFamily="34" charset="0"/>
               </a:rPr>
-              <a:t>2 </a:t>
-            </a:r>
-            <a:r>
-              <a:rPr lang="en-US" sz="3200" dirty="0" smtClean="0">
-                <a:latin typeface="Segoe UI Light" panose="020B0502040204020203" pitchFamily="34" charset="0"/>
-                <a:cs typeface="Segoe UI Light" panose="020B0502040204020203" pitchFamily="34" charset="0"/>
-              </a:rPr>
-              <a:t>kinds of Packages </a:t>
+              <a:t>2 kinds of Packages </a:t>
             </a:r>
           </a:p>
           <a:p>
@@ -9629,14 +9619,7 @@
                 <a:latin typeface="Segoe UI Light" panose="020B0502040204020203" pitchFamily="34" charset="0"/>
                 <a:cs typeface="Segoe UI Light" panose="020B0502040204020203" pitchFamily="34" charset="0"/>
               </a:rPr>
-              <a:t>Download and </a:t>
-            </a:r>
-            <a:r>
-              <a:rPr lang="en-US" sz="3200" dirty="0" smtClean="0">
-                <a:latin typeface="Segoe UI Light" panose="020B0502040204020203" pitchFamily="34" charset="0"/>
-                <a:cs typeface="Segoe UI Light" panose="020B0502040204020203" pitchFamily="34" charset="0"/>
-              </a:rPr>
-              <a:t>Install at </a:t>
+              <a:t>Download and Install at </a:t>
             </a:r>
           </a:p>
           <a:p>
@@ -9668,10 +9651,6 @@
               </a:rPr>
               <a:t>Mac OS X </a:t>
             </a:r>
-            <a:endParaRPr lang="en-US" sz="2800" dirty="0" smtClean="0">
-              <a:latin typeface="Segoe UI Light" panose="020B0502040204020203" pitchFamily="34" charset="0"/>
-              <a:cs typeface="Segoe UI Light" panose="020B0502040204020203" pitchFamily="34" charset="0"/>
-            </a:endParaRPr>
           </a:p>
         </p:txBody>
       </p:sp>
@@ -9715,11 +9694,11 @@
   <p:clrMapOvr>
     <a:masterClrMapping/>
   </p:clrMapOvr>
-  <mc:AlternateContent xmlns:mc="http://schemas.openxmlformats.org/markup-compatibility/2006">
-    <mc:Choice xmlns:p14="http://schemas.microsoft.com/office/powerpoint/2010/main" Requires="p14">
+  <mc:AlternateContent xmlns:mc="http://schemas.openxmlformats.org/markup-compatibility/2006" xmlns:p14="http://schemas.microsoft.com/office/powerpoint/2010/main">
+    <mc:Choice Requires="p14">
       <p:transition spd="slow" p14:dur="2000" advTm="62933"/>
     </mc:Choice>
-    <mc:Fallback>
+    <mc:Fallback xmlns="">
       <p:transition spd="slow" advTm="62933"/>
     </mc:Fallback>
   </mc:AlternateContent>
@@ -9772,16 +9751,7 @@
                 </a:solidFill>
                 <a:latin typeface="Segoe UI Light" panose="020B0502040204020203" pitchFamily="34" charset="0"/>
               </a:rPr>
-              <a:t>Neo4J </a:t>
-            </a:r>
-            <a:r>
-              <a:rPr lang="en-US" dirty="0" smtClean="0">
-                <a:solidFill>
-                  <a:srgbClr val="00B0F0"/>
-                </a:solidFill>
-                <a:latin typeface="Segoe UI Light" panose="020B0502040204020203" pitchFamily="34" charset="0"/>
-              </a:rPr>
-              <a:t>Installation – Local Machine</a:t>
+              <a:t>Neo4J Installation – Local Machine</a:t>
             </a:r>
             <a:endParaRPr lang="en-US" dirty="0"/>
           </a:p>
@@ -9928,11 +9898,11 @@
   <p:clrMapOvr>
     <a:masterClrMapping/>
   </p:clrMapOvr>
-  <mc:AlternateContent xmlns:mc="http://schemas.openxmlformats.org/markup-compatibility/2006">
-    <mc:Choice xmlns:p14="http://schemas.microsoft.com/office/powerpoint/2010/main" Requires="p14">
+  <mc:AlternateContent xmlns:mc="http://schemas.openxmlformats.org/markup-compatibility/2006" xmlns:p14="http://schemas.microsoft.com/office/powerpoint/2010/main">
+    <mc:Choice Requires="p14">
       <p:transition spd="slow" p14:dur="2000" advTm="4370"/>
     </mc:Choice>
-    <mc:Fallback>
+    <mc:Fallback xmlns="">
       <p:transition spd="slow" advTm="4370"/>
     </mc:Fallback>
   </mc:AlternateContent>
@@ -9985,16 +9955,7 @@
                 </a:solidFill>
                 <a:latin typeface="Segoe UI Light" panose="020B0502040204020203" pitchFamily="34" charset="0"/>
               </a:rPr>
-              <a:t>Neo4J </a:t>
-            </a:r>
-            <a:r>
-              <a:rPr lang="en-US" dirty="0" smtClean="0">
-                <a:solidFill>
-                  <a:srgbClr val="00B0F0"/>
-                </a:solidFill>
-                <a:latin typeface="Segoe UI Light" panose="020B0502040204020203" pitchFamily="34" charset="0"/>
-              </a:rPr>
-              <a:t>Installation – Azure - Demo</a:t>
+              <a:t>Neo4J Installation – Azure - Demo</a:t>
             </a:r>
             <a:endParaRPr lang="en-US" dirty="0"/>
           </a:p>
@@ -10107,11 +10068,11 @@
   <p:clrMapOvr>
     <a:masterClrMapping/>
   </p:clrMapOvr>
-  <mc:AlternateContent xmlns:mc="http://schemas.openxmlformats.org/markup-compatibility/2006">
-    <mc:Choice xmlns:p14="http://schemas.microsoft.com/office/powerpoint/2010/main" Requires="p14">
+  <mc:AlternateContent xmlns:mc="http://schemas.openxmlformats.org/markup-compatibility/2006" xmlns:p14="http://schemas.microsoft.com/office/powerpoint/2010/main">
+    <mc:Choice Requires="p14">
       <p:transition spd="slow" p14:dur="2000" advTm="23546"/>
     </mc:Choice>
-    <mc:Fallback>
+    <mc:Fallback xmlns="">
       <p:transition spd="slow" advTm="23546"/>
     </mc:Fallback>
   </mc:AlternateContent>
@@ -10164,16 +10125,7 @@
                 </a:solidFill>
                 <a:latin typeface="Segoe UI Light" panose="020B0502040204020203" pitchFamily="34" charset="0"/>
               </a:rPr>
-              <a:t>Neo4J </a:t>
-            </a:r>
-            <a:r>
-              <a:rPr lang="en-US" dirty="0" smtClean="0">
-                <a:solidFill>
-                  <a:srgbClr val="00B0F0"/>
-                </a:solidFill>
-                <a:latin typeface="Segoe UI Light" panose="020B0502040204020203" pitchFamily="34" charset="0"/>
-              </a:rPr>
-              <a:t>– Azure</a:t>
+              <a:t>Neo4J – Azure</a:t>
             </a:r>
             <a:endParaRPr lang="en-US" dirty="0"/>
           </a:p>
@@ -10315,11 +10267,11 @@
   <p:clrMapOvr>
     <a:masterClrMapping/>
   </p:clrMapOvr>
-  <mc:AlternateContent xmlns:mc="http://schemas.openxmlformats.org/markup-compatibility/2006">
-    <mc:Choice xmlns:p14="http://schemas.microsoft.com/office/powerpoint/2010/main" Requires="p14">
+  <mc:AlternateContent xmlns:mc="http://schemas.openxmlformats.org/markup-compatibility/2006" xmlns:p14="http://schemas.microsoft.com/office/powerpoint/2010/main">
+    <mc:Choice Requires="p14">
       <p:transition spd="slow" p14:dur="2000" advTm="32179"/>
     </mc:Choice>
-    <mc:Fallback>
+    <mc:Fallback xmlns="">
       <p:transition spd="slow" advTm="32179"/>
     </mc:Fallback>
   </mc:AlternateContent>
@@ -10438,11 +10390,11 @@
   <p:clrMapOvr>
     <a:masterClrMapping/>
   </p:clrMapOvr>
-  <mc:AlternateContent xmlns:mc="http://schemas.openxmlformats.org/markup-compatibility/2006">
-    <mc:Choice xmlns:p14="http://schemas.microsoft.com/office/powerpoint/2010/main" Requires="p14">
+  <mc:AlternateContent xmlns:mc="http://schemas.openxmlformats.org/markup-compatibility/2006" xmlns:p14="http://schemas.microsoft.com/office/powerpoint/2010/main">
+    <mc:Choice Requires="p14">
       <p:transition spd="slow" p14:dur="2000" advTm="21909"/>
     </mc:Choice>
-    <mc:Fallback>
+    <mc:Fallback xmlns="">
       <p:transition spd="slow" advTm="21909"/>
     </mc:Fallback>
   </mc:AlternateContent>
@@ -10622,11 +10574,11 @@
   <p:clrMapOvr>
     <a:masterClrMapping/>
   </p:clrMapOvr>
-  <mc:AlternateContent xmlns:mc="http://schemas.openxmlformats.org/markup-compatibility/2006">
-    <mc:Choice xmlns:p14="http://schemas.microsoft.com/office/powerpoint/2010/main" Requires="p14">
+  <mc:AlternateContent xmlns:mc="http://schemas.openxmlformats.org/markup-compatibility/2006" xmlns:p14="http://schemas.microsoft.com/office/powerpoint/2010/main">
+    <mc:Choice Requires="p14">
       <p:transition spd="slow" p14:dur="2000" advTm="47406"/>
     </mc:Choice>
-    <mc:Fallback>
+    <mc:Fallback xmlns="">
       <p:transition spd="slow" advTm="47406"/>
     </mc:Fallback>
   </mc:AlternateContent>
@@ -11967,11 +11919,11 @@
   <p:clrMapOvr>
     <a:masterClrMapping/>
   </p:clrMapOvr>
-  <mc:AlternateContent xmlns:mc="http://schemas.openxmlformats.org/markup-compatibility/2006">
-    <mc:Choice xmlns:p14="http://schemas.microsoft.com/office/powerpoint/2010/main" Requires="p14">
+  <mc:AlternateContent xmlns:mc="http://schemas.openxmlformats.org/markup-compatibility/2006" xmlns:p14="http://schemas.microsoft.com/office/powerpoint/2010/main">
+    <mc:Choice Requires="p14">
       <p:transition spd="slow" p14:dur="2000" advTm="49896"/>
     </mc:Choice>
-    <mc:Fallback>
+    <mc:Fallback xmlns="">
       <p:transition spd="slow" advTm="49896"/>
     </mc:Fallback>
   </mc:AlternateContent>
@@ -12085,11 +12037,11 @@
   <p:clrMapOvr>
     <a:masterClrMapping/>
   </p:clrMapOvr>
-  <mc:AlternateContent xmlns:mc="http://schemas.openxmlformats.org/markup-compatibility/2006">
-    <mc:Choice xmlns:p14="http://schemas.microsoft.com/office/powerpoint/2010/main" Requires="p14">
+  <mc:AlternateContent xmlns:mc="http://schemas.openxmlformats.org/markup-compatibility/2006" xmlns:p14="http://schemas.microsoft.com/office/powerpoint/2010/main">
+    <mc:Choice Requires="p14">
       <p:transition spd="slow" p14:dur="2000" advTm="24968"/>
     </mc:Choice>
-    <mc:Fallback>
+    <mc:Fallback xmlns="">
       <p:transition spd="slow" advTm="24968"/>
     </mc:Fallback>
   </mc:AlternateContent>
@@ -12805,11 +12757,11 @@
   <p:clrMapOvr>
     <a:masterClrMapping/>
   </p:clrMapOvr>
-  <mc:AlternateContent xmlns:mc="http://schemas.openxmlformats.org/markup-compatibility/2006">
-    <mc:Choice xmlns:p14="http://schemas.microsoft.com/office/powerpoint/2010/main" Requires="p14">
+  <mc:AlternateContent xmlns:mc="http://schemas.openxmlformats.org/markup-compatibility/2006" xmlns:p14="http://schemas.microsoft.com/office/powerpoint/2010/main">
+    <mc:Choice Requires="p14">
       <p:transition spd="slow" p14:dur="2000" advTm="67431"/>
     </mc:Choice>
-    <mc:Fallback>
+    <mc:Fallback xmlns="">
       <p:transition spd="slow" advTm="67431"/>
     </mc:Fallback>
   </mc:AlternateContent>
@@ -12958,11 +12910,11 @@
   <p:clrMapOvr>
     <a:masterClrMapping/>
   </p:clrMapOvr>
-  <mc:AlternateContent xmlns:mc="http://schemas.openxmlformats.org/markup-compatibility/2006">
-    <mc:Choice xmlns:p14="http://schemas.microsoft.com/office/powerpoint/2010/main" Requires="p14">
+  <mc:AlternateContent xmlns:mc="http://schemas.openxmlformats.org/markup-compatibility/2006" xmlns:p14="http://schemas.microsoft.com/office/powerpoint/2010/main">
+    <mc:Choice Requires="p14">
       <p:transition spd="slow" p14:dur="2000" advTm="53297"/>
     </mc:Choice>
-    <mc:Fallback>
+    <mc:Fallback xmlns="">
       <p:transition spd="slow" advTm="53297"/>
     </mc:Fallback>
   </mc:AlternateContent>
@@ -13156,11 +13108,11 @@
   <p:clrMapOvr>
     <a:masterClrMapping/>
   </p:clrMapOvr>
-  <mc:AlternateContent xmlns:mc="http://schemas.openxmlformats.org/markup-compatibility/2006">
-    <mc:Choice xmlns:p14="http://schemas.microsoft.com/office/powerpoint/2010/main" Requires="p14">
+  <mc:AlternateContent xmlns:mc="http://schemas.openxmlformats.org/markup-compatibility/2006" xmlns:p14="http://schemas.microsoft.com/office/powerpoint/2010/main">
+    <mc:Choice Requires="p14">
       <p:transition spd="slow" p14:dur="2000" advTm="94681"/>
     </mc:Choice>
-    <mc:Fallback>
+    <mc:Fallback xmlns="">
       <p:transition spd="slow" advTm="94681"/>
     </mc:Fallback>
   </mc:AlternateContent>
@@ -13245,15 +13197,7 @@
             <a:pPr lvl="1"/>
             <a:r>
               <a:rPr lang="en-US" dirty="0" smtClean="0"/>
-              <a:t>Find th</a:t>
-            </a:r>
-            <a:r>
-              <a:rPr lang="en-US" dirty="0" smtClean="0"/>
-              <a:t>e shortest </a:t>
-            </a:r>
-            <a:r>
-              <a:rPr lang="en-US" dirty="0" smtClean="0"/>
-              <a:t>Path between 2 Actors</a:t>
+              <a:t>Find the shortest Path between 2 Actors</a:t>
             </a:r>
           </a:p>
           <a:p>
@@ -13452,11 +13396,11 @@
   <p:clrMapOvr>
     <a:masterClrMapping/>
   </p:clrMapOvr>
-  <mc:AlternateContent xmlns:mc="http://schemas.openxmlformats.org/markup-compatibility/2006">
-    <mc:Choice xmlns:p14="http://schemas.microsoft.com/office/powerpoint/2010/main" Requires="p14">
+  <mc:AlternateContent xmlns:mc="http://schemas.openxmlformats.org/markup-compatibility/2006" xmlns:p14="http://schemas.microsoft.com/office/powerpoint/2010/main">
+    <mc:Choice Requires="p14">
       <p:transition spd="slow" p14:dur="2000" advTm="139843"/>
     </mc:Choice>
-    <mc:Fallback>
+    <mc:Fallback xmlns="">
       <p:transition spd="slow" advTm="139843"/>
     </mc:Fallback>
   </mc:AlternateContent>
@@ -13580,11 +13524,11 @@
   <p:clrMapOvr>
     <a:masterClrMapping/>
   </p:clrMapOvr>
-  <mc:AlternateContent xmlns:mc="http://schemas.openxmlformats.org/markup-compatibility/2006">
-    <mc:Choice xmlns:p14="http://schemas.microsoft.com/office/powerpoint/2010/main" Requires="p14">
+  <mc:AlternateContent xmlns:mc="http://schemas.openxmlformats.org/markup-compatibility/2006" xmlns:p14="http://schemas.microsoft.com/office/powerpoint/2010/main">
+    <mc:Choice Requires="p14">
       <p:transition spd="slow" p14:dur="2000" advTm="11059"/>
     </mc:Choice>
-    <mc:Fallback>
+    <mc:Fallback xmlns="">
       <p:transition spd="slow" advTm="11059"/>
     </mc:Fallback>
   </mc:AlternateContent>
@@ -13670,11 +13614,11 @@
   <p:clrMapOvr>
     <a:masterClrMapping/>
   </p:clrMapOvr>
-  <mc:AlternateContent xmlns:mc="http://schemas.openxmlformats.org/markup-compatibility/2006">
-    <mc:Choice xmlns:p14="http://schemas.microsoft.com/office/powerpoint/2010/main" Requires="p14">
+  <mc:AlternateContent xmlns:mc="http://schemas.openxmlformats.org/markup-compatibility/2006" xmlns:p14="http://schemas.microsoft.com/office/powerpoint/2010/main">
+    <mc:Choice Requires="p14">
       <p:transition spd="slow" p14:dur="2000" advTm="1128"/>
     </mc:Choice>
-    <mc:Fallback>
+    <mc:Fallback xmlns="">
       <p:transition spd="slow" advTm="1128"/>
     </mc:Fallback>
   </mc:AlternateContent>
@@ -14059,14 +14003,6 @@
               </a:rPr>
               <a:t> </a:t>
             </a:r>
-            <a:endParaRPr lang="en-US" dirty="0" smtClean="0">
-              <a:solidFill>
-                <a:schemeClr val="tx1"/>
-              </a:solidFill>
-              <a:latin typeface="Segoe UI Light" panose="020B0502040204020203" pitchFamily="34" charset="0"/>
-              <a:ea typeface="Segoe UI" panose="020B0502040204020203" pitchFamily="34" charset="0"/>
-              <a:cs typeface="Segoe UI" panose="020B0502040204020203" pitchFamily="34" charset="0"/>
-            </a:endParaRPr>
           </a:p>
           <a:p>
             <a:endParaRPr lang="en-US" dirty="0" smtClean="0">
@@ -14528,11 +14464,11 @@
   <p:clrMapOvr>
     <a:masterClrMapping/>
   </p:clrMapOvr>
-  <mc:AlternateContent xmlns:mc="http://schemas.openxmlformats.org/markup-compatibility/2006">
-    <mc:Choice xmlns:p14="http://schemas.microsoft.com/office/powerpoint/2010/main" Requires="p14">
+  <mc:AlternateContent xmlns:mc="http://schemas.openxmlformats.org/markup-compatibility/2006" xmlns:p14="http://schemas.microsoft.com/office/powerpoint/2010/main">
+    <mc:Choice Requires="p14">
       <p:transition spd="slow" p14:dur="2000" advTm="1120"/>
     </mc:Choice>
-    <mc:Fallback>
+    <mc:Fallback xmlns="">
       <p:transition spd="slow" advTm="1120"/>
     </mc:Fallback>
   </mc:AlternateContent>
@@ -15017,11 +14953,11 @@
   <p:clrMapOvr>
     <a:masterClrMapping/>
   </p:clrMapOvr>
-  <mc:AlternateContent xmlns:mc="http://schemas.openxmlformats.org/markup-compatibility/2006">
-    <mc:Choice xmlns:p14="http://schemas.microsoft.com/office/powerpoint/2010/main" Requires="p14">
+  <mc:AlternateContent xmlns:mc="http://schemas.openxmlformats.org/markup-compatibility/2006" xmlns:p14="http://schemas.microsoft.com/office/powerpoint/2010/main">
+    <mc:Choice Requires="p14">
       <p:transition spd="slow" p14:dur="2000" advTm="860"/>
     </mc:Choice>
-    <mc:Fallback>
+    <mc:Fallback xmlns="">
       <p:transition spd="slow" advTm="860"/>
     </mc:Fallback>
   </mc:AlternateContent>
@@ -15432,11 +15368,11 @@
   <p:clrMapOvr>
     <a:masterClrMapping/>
   </p:clrMapOvr>
-  <mc:AlternateContent xmlns:mc="http://schemas.openxmlformats.org/markup-compatibility/2006">
-    <mc:Choice xmlns:p14="http://schemas.microsoft.com/office/powerpoint/2010/main" Requires="p14">
+  <mc:AlternateContent xmlns:mc="http://schemas.openxmlformats.org/markup-compatibility/2006" xmlns:p14="http://schemas.microsoft.com/office/powerpoint/2010/main">
+    <mc:Choice Requires="p14">
       <p:transition spd="slow" p14:dur="2000" advTm="305"/>
     </mc:Choice>
-    <mc:Fallback>
+    <mc:Fallback xmlns="">
       <p:transition spd="slow" advTm="305"/>
     </mc:Fallback>
   </mc:AlternateContent>
@@ -16014,16 +15950,7 @@
                 </a:solidFill>
                 <a:latin typeface="Segoe UI Light" panose="020B0502040204020203" pitchFamily="34" charset="0"/>
               </a:rPr>
-              <a:t>Neo4j Language </a:t>
-            </a:r>
-            <a:r>
-              <a:rPr lang="en-US" sz="1800" dirty="0" smtClean="0">
-                <a:solidFill>
-                  <a:schemeClr val="tx1"/>
-                </a:solidFill>
-                <a:latin typeface="Segoe UI Light" panose="020B0502040204020203" pitchFamily="34" charset="0"/>
-              </a:rPr>
-              <a:t>Plugins</a:t>
+              <a:t>Neo4j Language Plugins</a:t>
             </a:r>
           </a:p>
           <a:p>
@@ -16054,12 +15981,6 @@
               </a:rPr>
               <a:t>Case Studies</a:t>
             </a:r>
-            <a:endParaRPr lang="en-US" sz="1800" dirty="0" smtClean="0">
-              <a:solidFill>
-                <a:schemeClr val="tx1"/>
-              </a:solidFill>
-              <a:latin typeface="Segoe UI Light" panose="020B0502040204020203" pitchFamily="34" charset="0"/>
-            </a:endParaRPr>
           </a:p>
           <a:p>
             <a:pPr marL="342900" indent="-342900">
@@ -16150,11 +16071,11 @@
   <p:clrMapOvr>
     <a:masterClrMapping/>
   </p:clrMapOvr>
-  <mc:AlternateContent xmlns:mc="http://schemas.openxmlformats.org/markup-compatibility/2006">
-    <mc:Choice xmlns:p14="http://schemas.microsoft.com/office/powerpoint/2010/main" Requires="p14">
+  <mc:AlternateContent xmlns:mc="http://schemas.openxmlformats.org/markup-compatibility/2006" xmlns:p14="http://schemas.microsoft.com/office/powerpoint/2010/main">
+    <mc:Choice Requires="p14">
       <p:transition spd="slow" p14:dur="2000" advTm="37515"/>
     </mc:Choice>
-    <mc:Fallback>
+    <mc:Fallback xmlns="">
       <p:transition spd="slow" advTm="37515"/>
     </mc:Fallback>
   </mc:AlternateContent>
@@ -16277,11 +16198,11 @@
   <p:clrMapOvr>
     <a:masterClrMapping/>
   </p:clrMapOvr>
-  <mc:AlternateContent xmlns:mc="http://schemas.openxmlformats.org/markup-compatibility/2006">
-    <mc:Choice xmlns:p14="http://schemas.microsoft.com/office/powerpoint/2010/main" Requires="p14">
+  <mc:AlternateContent xmlns:mc="http://schemas.openxmlformats.org/markup-compatibility/2006" xmlns:p14="http://schemas.microsoft.com/office/powerpoint/2010/main">
+    <mc:Choice Requires="p14">
       <p:transition spd="slow" p14:dur="2000" advTm="632"/>
     </mc:Choice>
-    <mc:Fallback>
+    <mc:Fallback xmlns="">
       <p:transition spd="slow" advTm="632"/>
     </mc:Fallback>
   </mc:AlternateContent>
@@ -16314,9 +16235,9 @@
       </p:grpSpPr>
       <p:pic>
         <p:nvPicPr>
-          <p:cNvPr id="5" name="Picture 1"/>
+          <p:cNvPr id="2" name="Picture 1"/>
           <p:cNvPicPr>
-            <a:picLocks noChangeAspect="1" noChangeArrowheads="1"/>
+            <a:picLocks noChangeAspect="1"/>
           </p:cNvPicPr>
           <p:nvPr/>
         </p:nvPicPr>
@@ -16328,2515 +16249,179 @@
               </a:ext>
             </a:extLst>
           </a:blip>
-          <a:srcRect l="2185" t="8627" r="2151" b="1569"/>
           <a:stretch>
             <a:fillRect/>
           </a:stretch>
         </p:blipFill>
-        <p:spPr bwMode="auto">
+        <p:spPr>
           <a:xfrm>
-            <a:off x="228600" y="0"/>
-            <a:ext cx="11671300" cy="5816600"/>
+            <a:off x="0" y="1487593"/>
+            <a:ext cx="3962400" cy="3125894"/>
+          </a:xfrm>
+          <a:prstGeom prst="rect">
+            <a:avLst/>
+          </a:prstGeom>
+        </p:spPr>
+      </p:pic>
+      <p:pic>
+        <p:nvPicPr>
+          <p:cNvPr id="3" name="Picture 2"/>
+          <p:cNvPicPr>
+            <a:picLocks noChangeAspect="1"/>
+          </p:cNvPicPr>
+          <p:nvPr/>
+        </p:nvPicPr>
+        <p:blipFill>
+          <a:blip r:embed="rId4">
+            <a:extLst>
+              <a:ext uri="{28A0092B-C50C-407E-A947-70E740481C1C}">
+                <a14:useLocalDpi xmlns:a14="http://schemas.microsoft.com/office/drawing/2010/main" val="0"/>
+              </a:ext>
+            </a:extLst>
+          </a:blip>
+          <a:stretch>
+            <a:fillRect/>
+          </a:stretch>
+        </p:blipFill>
+        <p:spPr>
+          <a:xfrm>
+            <a:off x="4648200" y="1421832"/>
+            <a:ext cx="4038600" cy="3226368"/>
+          </a:xfrm>
+          <a:prstGeom prst="rect">
+            <a:avLst/>
+          </a:prstGeom>
+        </p:spPr>
+      </p:pic>
+      <p:pic>
+        <p:nvPicPr>
+          <p:cNvPr id="4" name="Picture 3"/>
+          <p:cNvPicPr>
+            <a:picLocks noChangeAspect="1"/>
+          </p:cNvPicPr>
+          <p:nvPr/>
+        </p:nvPicPr>
+        <p:blipFill>
+          <a:blip r:embed="rId5">
+            <a:extLst>
+              <a:ext uri="{28A0092B-C50C-407E-A947-70E740481C1C}">
+                <a14:useLocalDpi xmlns:a14="http://schemas.microsoft.com/office/drawing/2010/main" val="0"/>
+              </a:ext>
+            </a:extLst>
+          </a:blip>
+          <a:stretch>
+            <a:fillRect/>
+          </a:stretch>
+        </p:blipFill>
+        <p:spPr>
+          <a:xfrm>
+            <a:off x="9258300" y="1828800"/>
+            <a:ext cx="2933700" cy="2346960"/>
+          </a:xfrm>
+          <a:prstGeom prst="rect">
+            <a:avLst/>
+          </a:prstGeom>
+        </p:spPr>
+      </p:pic>
+      <p:cxnSp>
+        <p:nvCxnSpPr>
+          <p:cNvPr id="25" name="Straight Arrow Connector 24"/>
+          <p:cNvCxnSpPr>
+            <a:stCxn id="2" idx="3"/>
+            <a:endCxn id="3" idx="1"/>
+          </p:cNvCxnSpPr>
+          <p:nvPr/>
+        </p:nvCxnSpPr>
+        <p:spPr>
+          <a:xfrm flipV="1">
+            <a:off x="3962400" y="3035016"/>
+            <a:ext cx="731520" cy="0"/>
+          </a:xfrm>
+          <a:prstGeom prst="straightConnector1">
+            <a:avLst/>
+          </a:prstGeom>
+          <a:ln w="47625">
+            <a:tailEnd type="triangle"/>
+          </a:ln>
+        </p:spPr>
+        <p:style>
+          <a:lnRef idx="3">
+            <a:schemeClr val="accent5"/>
+          </a:lnRef>
+          <a:fillRef idx="0">
+            <a:schemeClr val="accent5"/>
+          </a:fillRef>
+          <a:effectRef idx="2">
+            <a:schemeClr val="accent5"/>
+          </a:effectRef>
+          <a:fontRef idx="minor">
+            <a:schemeClr val="tx1"/>
+          </a:fontRef>
+        </p:style>
+      </p:cxnSp>
+      <p:cxnSp>
+        <p:nvCxnSpPr>
+          <p:cNvPr id="27" name="Straight Arrow Connector 26"/>
+          <p:cNvCxnSpPr>
+            <a:stCxn id="3" idx="3"/>
+            <a:endCxn id="4" idx="1"/>
+          </p:cNvCxnSpPr>
+          <p:nvPr/>
+        </p:nvCxnSpPr>
+        <p:spPr>
+          <a:xfrm flipV="1">
+            <a:off x="8686800" y="3002280"/>
+            <a:ext cx="571500" cy="32736"/>
+          </a:xfrm>
+          <a:prstGeom prst="straightConnector1">
+            <a:avLst/>
+          </a:prstGeom>
+          <a:ln w="47625">
+            <a:tailEnd type="triangle"/>
+          </a:ln>
+        </p:spPr>
+        <p:style>
+          <a:lnRef idx="3">
+            <a:schemeClr val="accent5"/>
+          </a:lnRef>
+          <a:fillRef idx="0">
+            <a:schemeClr val="accent5"/>
+          </a:fillRef>
+          <a:effectRef idx="2">
+            <a:schemeClr val="accent5"/>
+          </a:effectRef>
+          <a:fontRef idx="minor">
+            <a:schemeClr val="tx1"/>
+          </a:fontRef>
+        </p:style>
+      </p:cxnSp>
+      <p:sp>
+        <p:nvSpPr>
+          <p:cNvPr id="30" name="TextBox 29"/>
+          <p:cNvSpPr txBox="1"/>
+          <p:nvPr/>
+        </p:nvSpPr>
+        <p:spPr>
+          <a:xfrm>
+            <a:off x="9514497" y="6019800"/>
+            <a:ext cx="2753703" cy="369332"/>
           </a:xfrm>
           <a:prstGeom prst="rect">
             <a:avLst/>
           </a:prstGeom>
           <a:noFill/>
-          <a:ln>
-            <a:noFill/>
-          </a:ln>
-          <a:extLst>
-            <a:ext uri="{909E8E84-426E-40DD-AFC4-6F175D3DCCD1}">
-              <a14:hiddenFill xmlns:a14="http://schemas.microsoft.com/office/drawing/2010/main">
-                <a:solidFill>
-                  <a:srgbClr val="FFFFFF"/>
-                </a:solidFill>
-              </a14:hiddenFill>
-            </a:ext>
-            <a:ext uri="{91240B29-F687-4F45-9708-019B960494DF}">
-              <a14:hiddenLine xmlns:a14="http://schemas.microsoft.com/office/drawing/2010/main" w="12700">
-                <a:solidFill>
-                  <a:schemeClr val="tx1"/>
-                </a:solidFill>
-                <a:miter lim="800000"/>
-                <a:headEnd/>
-                <a:tailEnd/>
-              </a14:hiddenLine>
-            </a:ext>
-          </a:extLst>
-        </p:spPr>
-      </p:pic>
-      <p:sp>
-        <p:nvSpPr>
-          <p:cNvPr id="6" name="Oval 2"/>
-          <p:cNvSpPr>
-            <a:spLocks/>
-          </p:cNvSpPr>
-          <p:nvPr/>
-        </p:nvSpPr>
-        <p:spPr bwMode="auto">
-          <a:xfrm>
-            <a:off x="6096000" y="254000"/>
-            <a:ext cx="1270000" cy="1270000"/>
-          </a:xfrm>
-          <a:prstGeom prst="ellipse">
-            <a:avLst/>
-          </a:prstGeom>
-          <a:noFill/>
-          <a:ln w="101600">
-            <a:solidFill>
-              <a:schemeClr val="tx1"/>
-            </a:solidFill>
-            <a:miter lim="800000"/>
-            <a:headEnd/>
-            <a:tailEnd/>
-          </a:ln>
-          <a:effectLst>
-            <a:outerShdw blurRad="38100" dist="12699" dir="5400000" algn="ctr" rotWithShape="0">
-              <a:srgbClr val="808080">
-                <a:alpha val="50000"/>
-              </a:srgbClr>
-            </a:outerShdw>
-          </a:effectLst>
-          <a:extLst>
-            <a:ext uri="{909E8E84-426E-40DD-AFC4-6F175D3DCCD1}">
-              <a14:hiddenFill xmlns:a14="http://schemas.microsoft.com/office/drawing/2010/main">
-                <a:solidFill>
-                  <a:srgbClr val="FFFFFF"/>
-                </a:solidFill>
-              </a14:hiddenFill>
-            </a:ext>
-          </a:extLst>
         </p:spPr>
         <p:txBody>
-          <a:bodyPr lIns="0" tIns="0" rIns="0" bIns="0" anchor="ctr"/>
-          <a:lstStyle>
-            <a:lvl1pPr eaLnBrk="0" hangingPunct="0">
-              <a:defRPr sz="3800">
-                <a:solidFill>
-                  <a:srgbClr val="000000"/>
-                </a:solidFill>
-                <a:latin typeface="Gill Sans" pitchFamily="-84" charset="0"/>
-                <a:ea typeface="ヒラギノ角ゴ ProN W3" pitchFamily="-84" charset="-128"/>
-                <a:sym typeface="Gill Sans" pitchFamily="-84" charset="0"/>
-              </a:defRPr>
-            </a:lvl1pPr>
-            <a:lvl2pPr marL="742950" indent="-285750" eaLnBrk="0" hangingPunct="0">
-              <a:defRPr sz="3800">
-                <a:solidFill>
-                  <a:srgbClr val="000000"/>
-                </a:solidFill>
-                <a:latin typeface="Gill Sans" pitchFamily="-84" charset="0"/>
-                <a:ea typeface="ヒラギノ角ゴ ProN W3" pitchFamily="-84" charset="-128"/>
-                <a:sym typeface="Gill Sans" pitchFamily="-84" charset="0"/>
-              </a:defRPr>
-            </a:lvl2pPr>
-            <a:lvl3pPr marL="1143000" indent="-228600" eaLnBrk="0" hangingPunct="0">
-              <a:defRPr sz="3800">
-                <a:solidFill>
-                  <a:srgbClr val="000000"/>
-                </a:solidFill>
-                <a:latin typeface="Gill Sans" pitchFamily="-84" charset="0"/>
-                <a:ea typeface="ヒラギノ角ゴ ProN W3" pitchFamily="-84" charset="-128"/>
-                <a:sym typeface="Gill Sans" pitchFamily="-84" charset="0"/>
-              </a:defRPr>
-            </a:lvl3pPr>
-            <a:lvl4pPr marL="1600200" indent="-228600" eaLnBrk="0" hangingPunct="0">
-              <a:defRPr sz="3800">
-                <a:solidFill>
-                  <a:srgbClr val="000000"/>
-                </a:solidFill>
-                <a:latin typeface="Gill Sans" pitchFamily="-84" charset="0"/>
-                <a:ea typeface="ヒラギノ角ゴ ProN W3" pitchFamily="-84" charset="-128"/>
-                <a:sym typeface="Gill Sans" pitchFamily="-84" charset="0"/>
-              </a:defRPr>
-            </a:lvl4pPr>
-            <a:lvl5pPr marL="2057400" indent="-228600" eaLnBrk="0" hangingPunct="0">
-              <a:defRPr sz="3800">
-                <a:solidFill>
-                  <a:srgbClr val="000000"/>
-                </a:solidFill>
-                <a:latin typeface="Gill Sans" pitchFamily="-84" charset="0"/>
-                <a:ea typeface="ヒラギノ角ゴ ProN W3" pitchFamily="-84" charset="-128"/>
-                <a:sym typeface="Gill Sans" pitchFamily="-84" charset="0"/>
-              </a:defRPr>
-            </a:lvl5pPr>
-            <a:lvl6pPr marL="2514600" indent="-228600" algn="ctr" eaLnBrk="0" fontAlgn="base" hangingPunct="0">
-              <a:spcBef>
-                <a:spcPct val="0"/>
-              </a:spcBef>
-              <a:spcAft>
-                <a:spcPct val="0"/>
-              </a:spcAft>
-              <a:defRPr sz="3800">
-                <a:solidFill>
-                  <a:srgbClr val="000000"/>
-                </a:solidFill>
-                <a:latin typeface="Gill Sans" pitchFamily="-84" charset="0"/>
-                <a:ea typeface="ヒラギノ角ゴ ProN W3" pitchFamily="-84" charset="-128"/>
-                <a:sym typeface="Gill Sans" pitchFamily="-84" charset="0"/>
-              </a:defRPr>
-            </a:lvl6pPr>
-            <a:lvl7pPr marL="2971800" indent="-228600" algn="ctr" eaLnBrk="0" fontAlgn="base" hangingPunct="0">
-              <a:spcBef>
-                <a:spcPct val="0"/>
-              </a:spcBef>
-              <a:spcAft>
-                <a:spcPct val="0"/>
-              </a:spcAft>
-              <a:defRPr sz="3800">
-                <a:solidFill>
-                  <a:srgbClr val="000000"/>
-                </a:solidFill>
-                <a:latin typeface="Gill Sans" pitchFamily="-84" charset="0"/>
-                <a:ea typeface="ヒラギノ角ゴ ProN W3" pitchFamily="-84" charset="-128"/>
-                <a:sym typeface="Gill Sans" pitchFamily="-84" charset="0"/>
-              </a:defRPr>
-            </a:lvl7pPr>
-            <a:lvl8pPr marL="3429000" indent="-228600" algn="ctr" eaLnBrk="0" fontAlgn="base" hangingPunct="0">
-              <a:spcBef>
-                <a:spcPct val="0"/>
-              </a:spcBef>
-              <a:spcAft>
-                <a:spcPct val="0"/>
-              </a:spcAft>
-              <a:defRPr sz="3800">
-                <a:solidFill>
-                  <a:srgbClr val="000000"/>
-                </a:solidFill>
-                <a:latin typeface="Gill Sans" pitchFamily="-84" charset="0"/>
-                <a:ea typeface="ヒラギノ角ゴ ProN W3" pitchFamily="-84" charset="-128"/>
-                <a:sym typeface="Gill Sans" pitchFamily="-84" charset="0"/>
-              </a:defRPr>
-            </a:lvl8pPr>
-            <a:lvl9pPr marL="3886200" indent="-228600" algn="ctr" eaLnBrk="0" fontAlgn="base" hangingPunct="0">
-              <a:spcBef>
-                <a:spcPct val="0"/>
-              </a:spcBef>
-              <a:spcAft>
-                <a:spcPct val="0"/>
-              </a:spcAft>
-              <a:defRPr sz="3800">
-                <a:solidFill>
-                  <a:srgbClr val="000000"/>
-                </a:solidFill>
-                <a:latin typeface="Gill Sans" pitchFamily="-84" charset="0"/>
-                <a:ea typeface="ヒラギノ角ゴ ProN W3" pitchFamily="-84" charset="-128"/>
-                <a:sym typeface="Gill Sans" pitchFamily="-84" charset="0"/>
-              </a:defRPr>
-            </a:lvl9pPr>
-          </a:lstStyle>
-          <a:p>
-            <a:pPr algn="ctr" eaLnBrk="1" hangingPunct="1">
-              <a:defRPr/>
-            </a:pPr>
-            <a:r>
-              <a:rPr lang="en-US" altLang="en-US" sz="4800" smtClean="0">
-                <a:solidFill>
-                  <a:schemeClr val="tx1"/>
-                </a:solidFill>
-                <a:effectLst>
-                  <a:outerShdw blurRad="38100" dist="38100" dir="2700000" algn="tl">
-                    <a:srgbClr val="C0C0C0"/>
-                  </a:outerShdw>
-                </a:effectLst>
-                <a:ea typeface="ＭＳ Ｐゴシック" pitchFamily="-84" charset="-128"/>
-              </a:rPr>
-              <a:t>A</a:t>
-            </a:r>
-          </a:p>
-        </p:txBody>
-      </p:sp>
-      <p:sp>
-        <p:nvSpPr>
-          <p:cNvPr id="7" name="Oval 3"/>
-          <p:cNvSpPr>
-            <a:spLocks/>
-          </p:cNvSpPr>
-          <p:nvPr/>
-        </p:nvSpPr>
-        <p:spPr bwMode="auto">
-          <a:xfrm>
-            <a:off x="3454400" y="2463800"/>
-            <a:ext cx="1270000" cy="1270000"/>
-          </a:xfrm>
-          <a:prstGeom prst="ellipse">
-            <a:avLst/>
-          </a:prstGeom>
-          <a:noFill/>
-          <a:ln w="101600">
-            <a:solidFill>
-              <a:schemeClr val="tx1"/>
-            </a:solidFill>
-            <a:miter lim="800000"/>
-            <a:headEnd/>
-            <a:tailEnd/>
-          </a:ln>
-          <a:effectLst>
-            <a:outerShdw blurRad="38100" dist="12699" dir="5400000" algn="ctr" rotWithShape="0">
-              <a:srgbClr val="808080">
-                <a:alpha val="50000"/>
-              </a:srgbClr>
-            </a:outerShdw>
-          </a:effectLst>
-          <a:extLst>
-            <a:ext uri="{909E8E84-426E-40DD-AFC4-6F175D3DCCD1}">
-              <a14:hiddenFill xmlns:a14="http://schemas.microsoft.com/office/drawing/2010/main">
-                <a:solidFill>
-                  <a:srgbClr val="FFFFFF"/>
-                </a:solidFill>
-              </a14:hiddenFill>
-            </a:ext>
-          </a:extLst>
-        </p:spPr>
-        <p:txBody>
-          <a:bodyPr lIns="0" tIns="0" rIns="0" bIns="0" anchor="ctr"/>
-          <a:lstStyle>
-            <a:lvl1pPr eaLnBrk="0" hangingPunct="0">
-              <a:defRPr sz="3800">
-                <a:solidFill>
-                  <a:srgbClr val="000000"/>
-                </a:solidFill>
-                <a:latin typeface="Gill Sans" pitchFamily="-84" charset="0"/>
-                <a:ea typeface="ヒラギノ角ゴ ProN W3" pitchFamily="-84" charset="-128"/>
-                <a:sym typeface="Gill Sans" pitchFamily="-84" charset="0"/>
-              </a:defRPr>
-            </a:lvl1pPr>
-            <a:lvl2pPr marL="742950" indent="-285750" eaLnBrk="0" hangingPunct="0">
-              <a:defRPr sz="3800">
-                <a:solidFill>
-                  <a:srgbClr val="000000"/>
-                </a:solidFill>
-                <a:latin typeface="Gill Sans" pitchFamily="-84" charset="0"/>
-                <a:ea typeface="ヒラギノ角ゴ ProN W3" pitchFamily="-84" charset="-128"/>
-                <a:sym typeface="Gill Sans" pitchFamily="-84" charset="0"/>
-              </a:defRPr>
-            </a:lvl2pPr>
-            <a:lvl3pPr marL="1143000" indent="-228600" eaLnBrk="0" hangingPunct="0">
-              <a:defRPr sz="3800">
-                <a:solidFill>
-                  <a:srgbClr val="000000"/>
-                </a:solidFill>
-                <a:latin typeface="Gill Sans" pitchFamily="-84" charset="0"/>
-                <a:ea typeface="ヒラギノ角ゴ ProN W3" pitchFamily="-84" charset="-128"/>
-                <a:sym typeface="Gill Sans" pitchFamily="-84" charset="0"/>
-              </a:defRPr>
-            </a:lvl3pPr>
-            <a:lvl4pPr marL="1600200" indent="-228600" eaLnBrk="0" hangingPunct="0">
-              <a:defRPr sz="3800">
-                <a:solidFill>
-                  <a:srgbClr val="000000"/>
-                </a:solidFill>
-                <a:latin typeface="Gill Sans" pitchFamily="-84" charset="0"/>
-                <a:ea typeface="ヒラギノ角ゴ ProN W3" pitchFamily="-84" charset="-128"/>
-                <a:sym typeface="Gill Sans" pitchFamily="-84" charset="0"/>
-              </a:defRPr>
-            </a:lvl4pPr>
-            <a:lvl5pPr marL="2057400" indent="-228600" eaLnBrk="0" hangingPunct="0">
-              <a:defRPr sz="3800">
-                <a:solidFill>
-                  <a:srgbClr val="000000"/>
-                </a:solidFill>
-                <a:latin typeface="Gill Sans" pitchFamily="-84" charset="0"/>
-                <a:ea typeface="ヒラギノ角ゴ ProN W3" pitchFamily="-84" charset="-128"/>
-                <a:sym typeface="Gill Sans" pitchFamily="-84" charset="0"/>
-              </a:defRPr>
-            </a:lvl5pPr>
-            <a:lvl6pPr marL="2514600" indent="-228600" algn="ctr" eaLnBrk="0" fontAlgn="base" hangingPunct="0">
-              <a:spcBef>
-                <a:spcPct val="0"/>
-              </a:spcBef>
-              <a:spcAft>
-                <a:spcPct val="0"/>
-              </a:spcAft>
-              <a:defRPr sz="3800">
-                <a:solidFill>
-                  <a:srgbClr val="000000"/>
-                </a:solidFill>
-                <a:latin typeface="Gill Sans" pitchFamily="-84" charset="0"/>
-                <a:ea typeface="ヒラギノ角ゴ ProN W3" pitchFamily="-84" charset="-128"/>
-                <a:sym typeface="Gill Sans" pitchFamily="-84" charset="0"/>
-              </a:defRPr>
-            </a:lvl6pPr>
-            <a:lvl7pPr marL="2971800" indent="-228600" algn="ctr" eaLnBrk="0" fontAlgn="base" hangingPunct="0">
-              <a:spcBef>
-                <a:spcPct val="0"/>
-              </a:spcBef>
-              <a:spcAft>
-                <a:spcPct val="0"/>
-              </a:spcAft>
-              <a:defRPr sz="3800">
-                <a:solidFill>
-                  <a:srgbClr val="000000"/>
-                </a:solidFill>
-                <a:latin typeface="Gill Sans" pitchFamily="-84" charset="0"/>
-                <a:ea typeface="ヒラギノ角ゴ ProN W3" pitchFamily="-84" charset="-128"/>
-                <a:sym typeface="Gill Sans" pitchFamily="-84" charset="0"/>
-              </a:defRPr>
-            </a:lvl7pPr>
-            <a:lvl8pPr marL="3429000" indent="-228600" algn="ctr" eaLnBrk="0" fontAlgn="base" hangingPunct="0">
-              <a:spcBef>
-                <a:spcPct val="0"/>
-              </a:spcBef>
-              <a:spcAft>
-                <a:spcPct val="0"/>
-              </a:spcAft>
-              <a:defRPr sz="3800">
-                <a:solidFill>
-                  <a:srgbClr val="000000"/>
-                </a:solidFill>
-                <a:latin typeface="Gill Sans" pitchFamily="-84" charset="0"/>
-                <a:ea typeface="ヒラギノ角ゴ ProN W3" pitchFamily="-84" charset="-128"/>
-                <a:sym typeface="Gill Sans" pitchFamily="-84" charset="0"/>
-              </a:defRPr>
-            </a:lvl8pPr>
-            <a:lvl9pPr marL="3886200" indent="-228600" algn="ctr" eaLnBrk="0" fontAlgn="base" hangingPunct="0">
-              <a:spcBef>
-                <a:spcPct val="0"/>
-              </a:spcBef>
-              <a:spcAft>
-                <a:spcPct val="0"/>
-              </a:spcAft>
-              <a:defRPr sz="3800">
-                <a:solidFill>
-                  <a:srgbClr val="000000"/>
-                </a:solidFill>
-                <a:latin typeface="Gill Sans" pitchFamily="-84" charset="0"/>
-                <a:ea typeface="ヒラギノ角ゴ ProN W3" pitchFamily="-84" charset="-128"/>
-                <a:sym typeface="Gill Sans" pitchFamily="-84" charset="0"/>
-              </a:defRPr>
-            </a:lvl9pPr>
-          </a:lstStyle>
-          <a:p>
-            <a:pPr algn="ctr" eaLnBrk="1" hangingPunct="1">
-              <a:defRPr/>
-            </a:pPr>
-            <a:r>
-              <a:rPr lang="en-US" altLang="en-US" sz="4800" smtClean="0">
-                <a:solidFill>
-                  <a:schemeClr val="tx1"/>
-                </a:solidFill>
-                <a:effectLst>
-                  <a:outerShdw blurRad="38100" dist="38100" dir="2700000" algn="tl">
-                    <a:srgbClr val="C0C0C0"/>
-                  </a:outerShdw>
-                </a:effectLst>
-                <a:ea typeface="ＭＳ Ｐゴシック" pitchFamily="-84" charset="-128"/>
-              </a:rPr>
-              <a:t>B</a:t>
-            </a:r>
-          </a:p>
-        </p:txBody>
-      </p:sp>
-      <p:sp>
-        <p:nvSpPr>
-          <p:cNvPr id="8" name="Oval 4"/>
-          <p:cNvSpPr>
-            <a:spLocks/>
-          </p:cNvSpPr>
-          <p:nvPr/>
-        </p:nvSpPr>
-        <p:spPr bwMode="auto">
-          <a:xfrm>
-            <a:off x="4775200" y="4940300"/>
-            <a:ext cx="1270000" cy="1270000"/>
-          </a:xfrm>
-          <a:prstGeom prst="ellipse">
-            <a:avLst/>
-          </a:prstGeom>
-          <a:noFill/>
-          <a:ln w="101600">
-            <a:solidFill>
-              <a:schemeClr val="tx1"/>
-            </a:solidFill>
-            <a:miter lim="800000"/>
-            <a:headEnd/>
-            <a:tailEnd/>
-          </a:ln>
-          <a:effectLst>
-            <a:outerShdw blurRad="38100" dist="12699" dir="5400000" algn="ctr" rotWithShape="0">
-              <a:srgbClr val="808080">
-                <a:alpha val="50000"/>
-              </a:srgbClr>
-            </a:outerShdw>
-          </a:effectLst>
-          <a:extLst>
-            <a:ext uri="{909E8E84-426E-40DD-AFC4-6F175D3DCCD1}">
-              <a14:hiddenFill xmlns:a14="http://schemas.microsoft.com/office/drawing/2010/main">
-                <a:solidFill>
-                  <a:srgbClr val="FFFFFF"/>
-                </a:solidFill>
-              </a14:hiddenFill>
-            </a:ext>
-          </a:extLst>
-        </p:spPr>
-        <p:txBody>
-          <a:bodyPr lIns="0" tIns="0" rIns="0" bIns="0" anchor="ctr"/>
-          <a:lstStyle>
-            <a:lvl1pPr eaLnBrk="0" hangingPunct="0">
-              <a:defRPr sz="3800">
-                <a:solidFill>
-                  <a:srgbClr val="000000"/>
-                </a:solidFill>
-                <a:latin typeface="Gill Sans" pitchFamily="-84" charset="0"/>
-                <a:ea typeface="ヒラギノ角ゴ ProN W3" pitchFamily="-84" charset="-128"/>
-                <a:sym typeface="Gill Sans" pitchFamily="-84" charset="0"/>
-              </a:defRPr>
-            </a:lvl1pPr>
-            <a:lvl2pPr marL="742950" indent="-285750" eaLnBrk="0" hangingPunct="0">
-              <a:defRPr sz="3800">
-                <a:solidFill>
-                  <a:srgbClr val="000000"/>
-                </a:solidFill>
-                <a:latin typeface="Gill Sans" pitchFamily="-84" charset="0"/>
-                <a:ea typeface="ヒラギノ角ゴ ProN W3" pitchFamily="-84" charset="-128"/>
-                <a:sym typeface="Gill Sans" pitchFamily="-84" charset="0"/>
-              </a:defRPr>
-            </a:lvl2pPr>
-            <a:lvl3pPr marL="1143000" indent="-228600" eaLnBrk="0" hangingPunct="0">
-              <a:defRPr sz="3800">
-                <a:solidFill>
-                  <a:srgbClr val="000000"/>
-                </a:solidFill>
-                <a:latin typeface="Gill Sans" pitchFamily="-84" charset="0"/>
-                <a:ea typeface="ヒラギノ角ゴ ProN W3" pitchFamily="-84" charset="-128"/>
-                <a:sym typeface="Gill Sans" pitchFamily="-84" charset="0"/>
-              </a:defRPr>
-            </a:lvl3pPr>
-            <a:lvl4pPr marL="1600200" indent="-228600" eaLnBrk="0" hangingPunct="0">
-              <a:defRPr sz="3800">
-                <a:solidFill>
-                  <a:srgbClr val="000000"/>
-                </a:solidFill>
-                <a:latin typeface="Gill Sans" pitchFamily="-84" charset="0"/>
-                <a:ea typeface="ヒラギノ角ゴ ProN W3" pitchFamily="-84" charset="-128"/>
-                <a:sym typeface="Gill Sans" pitchFamily="-84" charset="0"/>
-              </a:defRPr>
-            </a:lvl4pPr>
-            <a:lvl5pPr marL="2057400" indent="-228600" eaLnBrk="0" hangingPunct="0">
-              <a:defRPr sz="3800">
-                <a:solidFill>
-                  <a:srgbClr val="000000"/>
-                </a:solidFill>
-                <a:latin typeface="Gill Sans" pitchFamily="-84" charset="0"/>
-                <a:ea typeface="ヒラギノ角ゴ ProN W3" pitchFamily="-84" charset="-128"/>
-                <a:sym typeface="Gill Sans" pitchFamily="-84" charset="0"/>
-              </a:defRPr>
-            </a:lvl5pPr>
-            <a:lvl6pPr marL="2514600" indent="-228600" algn="ctr" eaLnBrk="0" fontAlgn="base" hangingPunct="0">
-              <a:spcBef>
-                <a:spcPct val="0"/>
-              </a:spcBef>
-              <a:spcAft>
-                <a:spcPct val="0"/>
-              </a:spcAft>
-              <a:defRPr sz="3800">
-                <a:solidFill>
-                  <a:srgbClr val="000000"/>
-                </a:solidFill>
-                <a:latin typeface="Gill Sans" pitchFamily="-84" charset="0"/>
-                <a:ea typeface="ヒラギノ角ゴ ProN W3" pitchFamily="-84" charset="-128"/>
-                <a:sym typeface="Gill Sans" pitchFamily="-84" charset="0"/>
-              </a:defRPr>
-            </a:lvl6pPr>
-            <a:lvl7pPr marL="2971800" indent="-228600" algn="ctr" eaLnBrk="0" fontAlgn="base" hangingPunct="0">
-              <a:spcBef>
-                <a:spcPct val="0"/>
-              </a:spcBef>
-              <a:spcAft>
-                <a:spcPct val="0"/>
-              </a:spcAft>
-              <a:defRPr sz="3800">
-                <a:solidFill>
-                  <a:srgbClr val="000000"/>
-                </a:solidFill>
-                <a:latin typeface="Gill Sans" pitchFamily="-84" charset="0"/>
-                <a:ea typeface="ヒラギノ角ゴ ProN W3" pitchFamily="-84" charset="-128"/>
-                <a:sym typeface="Gill Sans" pitchFamily="-84" charset="0"/>
-              </a:defRPr>
-            </a:lvl7pPr>
-            <a:lvl8pPr marL="3429000" indent="-228600" algn="ctr" eaLnBrk="0" fontAlgn="base" hangingPunct="0">
-              <a:spcBef>
-                <a:spcPct val="0"/>
-              </a:spcBef>
-              <a:spcAft>
-                <a:spcPct val="0"/>
-              </a:spcAft>
-              <a:defRPr sz="3800">
-                <a:solidFill>
-                  <a:srgbClr val="000000"/>
-                </a:solidFill>
-                <a:latin typeface="Gill Sans" pitchFamily="-84" charset="0"/>
-                <a:ea typeface="ヒラギノ角ゴ ProN W3" pitchFamily="-84" charset="-128"/>
-                <a:sym typeface="Gill Sans" pitchFamily="-84" charset="0"/>
-              </a:defRPr>
-            </a:lvl8pPr>
-            <a:lvl9pPr marL="3886200" indent="-228600" algn="ctr" eaLnBrk="0" fontAlgn="base" hangingPunct="0">
-              <a:spcBef>
-                <a:spcPct val="0"/>
-              </a:spcBef>
-              <a:spcAft>
-                <a:spcPct val="0"/>
-              </a:spcAft>
-              <a:defRPr sz="3800">
-                <a:solidFill>
-                  <a:srgbClr val="000000"/>
-                </a:solidFill>
-                <a:latin typeface="Gill Sans" pitchFamily="-84" charset="0"/>
-                <a:ea typeface="ヒラギノ角ゴ ProN W3" pitchFamily="-84" charset="-128"/>
-                <a:sym typeface="Gill Sans" pitchFamily="-84" charset="0"/>
-              </a:defRPr>
-            </a:lvl9pPr>
-          </a:lstStyle>
-          <a:p>
-            <a:pPr algn="ctr" eaLnBrk="1" hangingPunct="1">
-              <a:defRPr/>
-            </a:pPr>
-            <a:r>
-              <a:rPr lang="en-US" altLang="en-US" sz="4800" smtClean="0">
-                <a:solidFill>
-                  <a:schemeClr val="tx1"/>
-                </a:solidFill>
-                <a:effectLst>
-                  <a:outerShdw blurRad="38100" dist="38100" dir="2700000" algn="tl">
-                    <a:srgbClr val="C0C0C0"/>
-                  </a:outerShdw>
-                </a:effectLst>
-                <a:ea typeface="ＭＳ Ｐゴシック" pitchFamily="-84" charset="-128"/>
-              </a:rPr>
-              <a:t>D</a:t>
-            </a:r>
-          </a:p>
-        </p:txBody>
-      </p:sp>
-      <p:sp>
-        <p:nvSpPr>
-          <p:cNvPr id="9" name="Oval 5"/>
-          <p:cNvSpPr>
-            <a:spLocks/>
-          </p:cNvSpPr>
-          <p:nvPr/>
-        </p:nvSpPr>
-        <p:spPr bwMode="auto">
-          <a:xfrm>
-            <a:off x="10248900" y="2705100"/>
-            <a:ext cx="1270000" cy="1270000"/>
-          </a:xfrm>
-          <a:prstGeom prst="ellipse">
-            <a:avLst/>
-          </a:prstGeom>
-          <a:noFill/>
-          <a:ln w="101600">
-            <a:solidFill>
-              <a:schemeClr val="tx1"/>
-            </a:solidFill>
-            <a:miter lim="800000"/>
-            <a:headEnd/>
-            <a:tailEnd/>
-          </a:ln>
-          <a:effectLst>
-            <a:outerShdw blurRad="38100" dist="12699" dir="5400000" algn="ctr" rotWithShape="0">
-              <a:srgbClr val="808080">
-                <a:alpha val="50000"/>
-              </a:srgbClr>
-            </a:outerShdw>
-          </a:effectLst>
-          <a:extLst>
-            <a:ext uri="{909E8E84-426E-40DD-AFC4-6F175D3DCCD1}">
-              <a14:hiddenFill xmlns:a14="http://schemas.microsoft.com/office/drawing/2010/main">
-                <a:solidFill>
-                  <a:srgbClr val="FFFFFF"/>
-                </a:solidFill>
-              </a14:hiddenFill>
-            </a:ext>
-          </a:extLst>
-        </p:spPr>
-        <p:txBody>
-          <a:bodyPr lIns="0" tIns="0" rIns="0" bIns="0" anchor="ctr"/>
-          <a:lstStyle>
-            <a:lvl1pPr eaLnBrk="0" hangingPunct="0">
-              <a:defRPr sz="3800">
-                <a:solidFill>
-                  <a:srgbClr val="000000"/>
-                </a:solidFill>
-                <a:latin typeface="Gill Sans" pitchFamily="-84" charset="0"/>
-                <a:ea typeface="ヒラギノ角ゴ ProN W3" pitchFamily="-84" charset="-128"/>
-                <a:sym typeface="Gill Sans" pitchFamily="-84" charset="0"/>
-              </a:defRPr>
-            </a:lvl1pPr>
-            <a:lvl2pPr marL="742950" indent="-285750" eaLnBrk="0" hangingPunct="0">
-              <a:defRPr sz="3800">
-                <a:solidFill>
-                  <a:srgbClr val="000000"/>
-                </a:solidFill>
-                <a:latin typeface="Gill Sans" pitchFamily="-84" charset="0"/>
-                <a:ea typeface="ヒラギノ角ゴ ProN W3" pitchFamily="-84" charset="-128"/>
-                <a:sym typeface="Gill Sans" pitchFamily="-84" charset="0"/>
-              </a:defRPr>
-            </a:lvl2pPr>
-            <a:lvl3pPr marL="1143000" indent="-228600" eaLnBrk="0" hangingPunct="0">
-              <a:defRPr sz="3800">
-                <a:solidFill>
-                  <a:srgbClr val="000000"/>
-                </a:solidFill>
-                <a:latin typeface="Gill Sans" pitchFamily="-84" charset="0"/>
-                <a:ea typeface="ヒラギノ角ゴ ProN W3" pitchFamily="-84" charset="-128"/>
-                <a:sym typeface="Gill Sans" pitchFamily="-84" charset="0"/>
-              </a:defRPr>
-            </a:lvl3pPr>
-            <a:lvl4pPr marL="1600200" indent="-228600" eaLnBrk="0" hangingPunct="0">
-              <a:defRPr sz="3800">
-                <a:solidFill>
-                  <a:srgbClr val="000000"/>
-                </a:solidFill>
-                <a:latin typeface="Gill Sans" pitchFamily="-84" charset="0"/>
-                <a:ea typeface="ヒラギノ角ゴ ProN W3" pitchFamily="-84" charset="-128"/>
-                <a:sym typeface="Gill Sans" pitchFamily="-84" charset="0"/>
-              </a:defRPr>
-            </a:lvl4pPr>
-            <a:lvl5pPr marL="2057400" indent="-228600" eaLnBrk="0" hangingPunct="0">
-              <a:defRPr sz="3800">
-                <a:solidFill>
-                  <a:srgbClr val="000000"/>
-                </a:solidFill>
-                <a:latin typeface="Gill Sans" pitchFamily="-84" charset="0"/>
-                <a:ea typeface="ヒラギノ角ゴ ProN W3" pitchFamily="-84" charset="-128"/>
-                <a:sym typeface="Gill Sans" pitchFamily="-84" charset="0"/>
-              </a:defRPr>
-            </a:lvl5pPr>
-            <a:lvl6pPr marL="2514600" indent="-228600" algn="ctr" eaLnBrk="0" fontAlgn="base" hangingPunct="0">
-              <a:spcBef>
-                <a:spcPct val="0"/>
-              </a:spcBef>
-              <a:spcAft>
-                <a:spcPct val="0"/>
-              </a:spcAft>
-              <a:defRPr sz="3800">
-                <a:solidFill>
-                  <a:srgbClr val="000000"/>
-                </a:solidFill>
-                <a:latin typeface="Gill Sans" pitchFamily="-84" charset="0"/>
-                <a:ea typeface="ヒラギノ角ゴ ProN W3" pitchFamily="-84" charset="-128"/>
-                <a:sym typeface="Gill Sans" pitchFamily="-84" charset="0"/>
-              </a:defRPr>
-            </a:lvl6pPr>
-            <a:lvl7pPr marL="2971800" indent="-228600" algn="ctr" eaLnBrk="0" fontAlgn="base" hangingPunct="0">
-              <a:spcBef>
-                <a:spcPct val="0"/>
-              </a:spcBef>
-              <a:spcAft>
-                <a:spcPct val="0"/>
-              </a:spcAft>
-              <a:defRPr sz="3800">
-                <a:solidFill>
-                  <a:srgbClr val="000000"/>
-                </a:solidFill>
-                <a:latin typeface="Gill Sans" pitchFamily="-84" charset="0"/>
-                <a:ea typeface="ヒラギノ角ゴ ProN W3" pitchFamily="-84" charset="-128"/>
-                <a:sym typeface="Gill Sans" pitchFamily="-84" charset="0"/>
-              </a:defRPr>
-            </a:lvl7pPr>
-            <a:lvl8pPr marL="3429000" indent="-228600" algn="ctr" eaLnBrk="0" fontAlgn="base" hangingPunct="0">
-              <a:spcBef>
-                <a:spcPct val="0"/>
-              </a:spcBef>
-              <a:spcAft>
-                <a:spcPct val="0"/>
-              </a:spcAft>
-              <a:defRPr sz="3800">
-                <a:solidFill>
-                  <a:srgbClr val="000000"/>
-                </a:solidFill>
-                <a:latin typeface="Gill Sans" pitchFamily="-84" charset="0"/>
-                <a:ea typeface="ヒラギノ角ゴ ProN W3" pitchFamily="-84" charset="-128"/>
-                <a:sym typeface="Gill Sans" pitchFamily="-84" charset="0"/>
-              </a:defRPr>
-            </a:lvl8pPr>
-            <a:lvl9pPr marL="3886200" indent="-228600" algn="ctr" eaLnBrk="0" fontAlgn="base" hangingPunct="0">
-              <a:spcBef>
-                <a:spcPct val="0"/>
-              </a:spcBef>
-              <a:spcAft>
-                <a:spcPct val="0"/>
-              </a:spcAft>
-              <a:defRPr sz="3800">
-                <a:solidFill>
-                  <a:srgbClr val="000000"/>
-                </a:solidFill>
-                <a:latin typeface="Gill Sans" pitchFamily="-84" charset="0"/>
-                <a:ea typeface="ヒラギノ角ゴ ProN W3" pitchFamily="-84" charset="-128"/>
-                <a:sym typeface="Gill Sans" pitchFamily="-84" charset="0"/>
-              </a:defRPr>
-            </a:lvl9pPr>
-          </a:lstStyle>
-          <a:p>
-            <a:pPr algn="ctr" eaLnBrk="1" hangingPunct="1">
-              <a:defRPr/>
-            </a:pPr>
-            <a:r>
-              <a:rPr lang="en-US" altLang="en-US" sz="4800" smtClean="0">
-                <a:solidFill>
-                  <a:schemeClr val="tx1"/>
-                </a:solidFill>
-                <a:effectLst>
-                  <a:outerShdw blurRad="38100" dist="38100" dir="2700000" algn="tl">
-                    <a:srgbClr val="C0C0C0"/>
-                  </a:outerShdw>
-                </a:effectLst>
-                <a:ea typeface="ＭＳ Ｐゴシック" pitchFamily="-84" charset="-128"/>
-              </a:rPr>
-              <a:t>C</a:t>
-            </a:r>
-          </a:p>
-        </p:txBody>
-      </p:sp>
-      <p:sp>
-        <p:nvSpPr>
-          <p:cNvPr id="10" name="Freeform 6"/>
-          <p:cNvSpPr>
-            <a:spLocks/>
-          </p:cNvSpPr>
-          <p:nvPr/>
-        </p:nvSpPr>
-        <p:spPr bwMode="auto">
-          <a:xfrm>
-            <a:off x="4681538" y="3419475"/>
-            <a:ext cx="800100" cy="1520825"/>
-          </a:xfrm>
-          <a:custGeom>
-            <a:avLst/>
-            <a:gdLst>
-              <a:gd name="T0" fmla="*/ 0 w 21600"/>
-              <a:gd name="T1" fmla="*/ 0 h 21600"/>
-              <a:gd name="T2" fmla="*/ 2147483646 w 21600"/>
-              <a:gd name="T3" fmla="*/ 2147483646 h 21600"/>
-              <a:gd name="T4" fmla="*/ 0 60000 65536"/>
-              <a:gd name="T5" fmla="*/ 0 60000 65536"/>
-            </a:gdLst>
-            <a:ahLst/>
-            <a:cxnLst>
-              <a:cxn ang="T4">
-                <a:pos x="T0" y="T1"/>
-              </a:cxn>
-              <a:cxn ang="T5">
-                <a:pos x="T2" y="T3"/>
-              </a:cxn>
-            </a:cxnLst>
-            <a:rect l="0" t="0" r="r" b="b"/>
-            <a:pathLst>
-              <a:path w="21600" h="21600">
-                <a:moveTo>
-                  <a:pt x="0" y="0"/>
-                </a:moveTo>
-                <a:cubicBezTo>
-                  <a:pt x="11502" y="5275"/>
-                  <a:pt x="20902" y="10381"/>
-                  <a:pt x="21600" y="21600"/>
-                </a:cubicBezTo>
-              </a:path>
-            </a:pathLst>
-          </a:custGeom>
-          <a:noFill/>
-          <a:ln w="76200" cap="flat">
-            <a:solidFill>
-              <a:schemeClr val="tx1"/>
-            </a:solidFill>
-            <a:prstDash val="solid"/>
-            <a:miter lim="800000"/>
-            <a:headEnd type="triangle" w="med" len="med"/>
-            <a:tailEnd type="triangle" w="med" len="med"/>
-          </a:ln>
-          <a:extLst>
-            <a:ext uri="{909E8E84-426E-40DD-AFC4-6F175D3DCCD1}">
-              <a14:hiddenFill xmlns:a14="http://schemas.microsoft.com/office/drawing/2010/main">
-                <a:solidFill>
-                  <a:srgbClr val="FFFFFF"/>
-                </a:solidFill>
-              </a14:hiddenFill>
-            </a:ext>
-          </a:extLst>
-        </p:spPr>
-        <p:txBody>
-          <a:bodyPr lIns="0" tIns="0" rIns="0" bIns="0"/>
-          <a:lstStyle/>
-          <a:p>
-            <a:endParaRPr lang="en-US"/>
-          </a:p>
-        </p:txBody>
-      </p:sp>
-      <p:sp>
-        <p:nvSpPr>
-          <p:cNvPr id="11" name="Freeform 7"/>
-          <p:cNvSpPr>
-            <a:spLocks/>
-          </p:cNvSpPr>
-          <p:nvPr/>
-        </p:nvSpPr>
-        <p:spPr bwMode="auto">
-          <a:xfrm>
-            <a:off x="3519488" y="3740150"/>
-            <a:ext cx="1285875" cy="1717675"/>
-          </a:xfrm>
-          <a:custGeom>
-            <a:avLst/>
-            <a:gdLst>
-              <a:gd name="T0" fmla="*/ 2147483646 w 15454"/>
-              <a:gd name="T1" fmla="*/ 2147483646 h 21600"/>
-              <a:gd name="T2" fmla="*/ 2147483646 w 15454"/>
-              <a:gd name="T3" fmla="*/ 0 h 21600"/>
-              <a:gd name="T4" fmla="*/ 0 60000 65536"/>
-              <a:gd name="T5" fmla="*/ 0 60000 65536"/>
-            </a:gdLst>
-            <a:ahLst/>
-            <a:cxnLst>
-              <a:cxn ang="T4">
-                <a:pos x="T0" y="T1"/>
-              </a:cxn>
-              <a:cxn ang="T5">
-                <a:pos x="T2" y="T3"/>
-              </a:cxn>
-            </a:cxnLst>
-            <a:rect l="0" t="0" r="r" b="b"/>
-            <a:pathLst>
-              <a:path w="15454" h="21600">
-                <a:moveTo>
-                  <a:pt x="15454" y="21600"/>
-                </a:moveTo>
-                <a:cubicBezTo>
-                  <a:pt x="5179" y="19690"/>
-                  <a:pt x="-6146" y="12385"/>
-                  <a:pt x="3916" y="0"/>
-                </a:cubicBezTo>
-              </a:path>
-            </a:pathLst>
-          </a:custGeom>
-          <a:noFill/>
-          <a:ln w="76200" cap="flat">
-            <a:solidFill>
-              <a:schemeClr val="tx1"/>
-            </a:solidFill>
-            <a:prstDash val="solid"/>
-            <a:miter lim="800000"/>
-            <a:headEnd type="triangle" w="med" len="med"/>
-            <a:tailEnd type="triangle" w="med" len="med"/>
-          </a:ln>
-          <a:extLst>
-            <a:ext uri="{909E8E84-426E-40DD-AFC4-6F175D3DCCD1}">
-              <a14:hiddenFill xmlns:a14="http://schemas.microsoft.com/office/drawing/2010/main">
-                <a:solidFill>
-                  <a:srgbClr val="FFFFFF"/>
-                </a:solidFill>
-              </a14:hiddenFill>
-            </a:ext>
-          </a:extLst>
-        </p:spPr>
-        <p:txBody>
-          <a:bodyPr lIns="0" tIns="0" rIns="0" bIns="0"/>
-          <a:lstStyle/>
-          <a:p>
-            <a:endParaRPr lang="en-US"/>
-          </a:p>
-        </p:txBody>
-      </p:sp>
-      <p:sp>
-        <p:nvSpPr>
-          <p:cNvPr id="12" name="Freeform 8"/>
-          <p:cNvSpPr>
-            <a:spLocks/>
-          </p:cNvSpPr>
-          <p:nvPr/>
-        </p:nvSpPr>
-        <p:spPr bwMode="auto">
-          <a:xfrm>
-            <a:off x="2930525" y="461963"/>
-            <a:ext cx="3228975" cy="2362200"/>
-          </a:xfrm>
-          <a:custGeom>
-            <a:avLst/>
-            <a:gdLst>
-              <a:gd name="T0" fmla="*/ 2147483646 w 17401"/>
-              <a:gd name="T1" fmla="*/ 2147483646 h 18372"/>
-              <a:gd name="T2" fmla="*/ 2147483646 w 17401"/>
-              <a:gd name="T3" fmla="*/ 2147483646 h 18372"/>
-              <a:gd name="T4" fmla="*/ 0 60000 65536"/>
-              <a:gd name="T5" fmla="*/ 0 60000 65536"/>
-            </a:gdLst>
-            <a:ahLst/>
-            <a:cxnLst>
-              <a:cxn ang="T4">
-                <a:pos x="T0" y="T1"/>
-              </a:cxn>
-              <a:cxn ang="T5">
-                <a:pos x="T2" y="T3"/>
-              </a:cxn>
-            </a:cxnLst>
-            <a:rect l="0" t="0" r="r" b="b"/>
-            <a:pathLst>
-              <a:path w="17401" h="18372">
-                <a:moveTo>
-                  <a:pt x="2999" y="18372"/>
-                </a:moveTo>
-                <a:cubicBezTo>
-                  <a:pt x="-4199" y="9721"/>
-                  <a:pt x="1931" y="-3228"/>
-                  <a:pt x="17401" y="735"/>
-                </a:cubicBezTo>
-              </a:path>
-            </a:pathLst>
-          </a:custGeom>
-          <a:noFill/>
-          <a:ln w="76200" cap="flat">
-            <a:solidFill>
-              <a:schemeClr val="tx1"/>
-            </a:solidFill>
-            <a:prstDash val="solid"/>
-            <a:miter lim="800000"/>
-            <a:headEnd type="triangle" w="med" len="med"/>
-            <a:tailEnd type="triangle" w="med" len="med"/>
-          </a:ln>
-          <a:extLst>
-            <a:ext uri="{909E8E84-426E-40DD-AFC4-6F175D3DCCD1}">
-              <a14:hiddenFill xmlns:a14="http://schemas.microsoft.com/office/drawing/2010/main">
-                <a:solidFill>
-                  <a:srgbClr val="FFFFFF"/>
-                </a:solidFill>
-              </a14:hiddenFill>
-            </a:ext>
-          </a:extLst>
-        </p:spPr>
-        <p:txBody>
-          <a:bodyPr lIns="0" tIns="0" rIns="0" bIns="0"/>
-          <a:lstStyle/>
-          <a:p>
-            <a:endParaRPr lang="en-US"/>
-          </a:p>
-        </p:txBody>
-      </p:sp>
-      <p:sp>
-        <p:nvSpPr>
-          <p:cNvPr id="13" name="Freeform 9"/>
-          <p:cNvSpPr>
-            <a:spLocks/>
-          </p:cNvSpPr>
-          <p:nvPr/>
-        </p:nvSpPr>
-        <p:spPr bwMode="auto">
-          <a:xfrm>
-            <a:off x="4589463" y="1344613"/>
-            <a:ext cx="1671637" cy="1370012"/>
-          </a:xfrm>
-          <a:custGeom>
-            <a:avLst/>
-            <a:gdLst>
-              <a:gd name="T0" fmla="*/ 0 w 21600"/>
-              <a:gd name="T1" fmla="*/ 2147483646 h 21600"/>
-              <a:gd name="T2" fmla="*/ 2147483646 w 21600"/>
-              <a:gd name="T3" fmla="*/ 0 h 21600"/>
-              <a:gd name="T4" fmla="*/ 0 60000 65536"/>
-              <a:gd name="T5" fmla="*/ 0 60000 65536"/>
-            </a:gdLst>
-            <a:ahLst/>
-            <a:cxnLst>
-              <a:cxn ang="T4">
-                <a:pos x="T0" y="T1"/>
-              </a:cxn>
-              <a:cxn ang="T5">
-                <a:pos x="T2" y="T3"/>
-              </a:cxn>
-            </a:cxnLst>
-            <a:rect l="0" t="0" r="r" b="b"/>
-            <a:pathLst>
-              <a:path w="21600" h="21600">
-                <a:moveTo>
-                  <a:pt x="0" y="21600"/>
-                </a:moveTo>
-                <a:cubicBezTo>
-                  <a:pt x="0" y="21600"/>
-                  <a:pt x="13573" y="20170"/>
-                  <a:pt x="21600" y="0"/>
-                </a:cubicBezTo>
-              </a:path>
-            </a:pathLst>
-          </a:custGeom>
-          <a:noFill/>
-          <a:ln w="76200" cap="flat">
-            <a:solidFill>
-              <a:schemeClr val="tx1"/>
-            </a:solidFill>
-            <a:prstDash val="solid"/>
-            <a:miter lim="800000"/>
-            <a:headEnd type="triangle" w="med" len="med"/>
-            <a:tailEnd type="triangle" w="med" len="med"/>
-          </a:ln>
-          <a:extLst>
-            <a:ext uri="{909E8E84-426E-40DD-AFC4-6F175D3DCCD1}">
-              <a14:hiddenFill xmlns:a14="http://schemas.microsoft.com/office/drawing/2010/main">
-                <a:solidFill>
-                  <a:srgbClr val="FFFFFF"/>
-                </a:solidFill>
-              </a14:hiddenFill>
-            </a:ext>
-          </a:extLst>
-        </p:spPr>
-        <p:txBody>
-          <a:bodyPr lIns="0" tIns="0" rIns="0" bIns="0"/>
-          <a:lstStyle/>
-          <a:p>
-            <a:endParaRPr lang="en-US"/>
-          </a:p>
-        </p:txBody>
-      </p:sp>
-      <p:sp>
-        <p:nvSpPr>
-          <p:cNvPr id="14" name="Freeform 10"/>
-          <p:cNvSpPr>
-            <a:spLocks/>
-          </p:cNvSpPr>
-          <p:nvPr/>
-        </p:nvSpPr>
-        <p:spPr bwMode="auto">
-          <a:xfrm>
-            <a:off x="4751388" y="2794000"/>
-            <a:ext cx="5510212" cy="484188"/>
-          </a:xfrm>
-          <a:custGeom>
-            <a:avLst/>
-            <a:gdLst>
-              <a:gd name="T0" fmla="*/ 0 w 21600"/>
-              <a:gd name="T1" fmla="*/ 2147483646 h 14207"/>
-              <a:gd name="T2" fmla="*/ 2147483646 w 21600"/>
-              <a:gd name="T3" fmla="*/ 2147483646 h 14207"/>
-              <a:gd name="T4" fmla="*/ 0 60000 65536"/>
-              <a:gd name="T5" fmla="*/ 0 60000 65536"/>
-            </a:gdLst>
-            <a:ahLst/>
-            <a:cxnLst>
-              <a:cxn ang="T4">
-                <a:pos x="T0" y="T1"/>
-              </a:cxn>
-              <a:cxn ang="T5">
-                <a:pos x="T2" y="T3"/>
-              </a:cxn>
-            </a:cxnLst>
-            <a:rect l="0" t="0" r="r" b="b"/>
-            <a:pathLst>
-              <a:path w="21600" h="14207">
-                <a:moveTo>
-                  <a:pt x="0" y="8603"/>
-                </a:moveTo>
-                <a:cubicBezTo>
-                  <a:pt x="6186" y="-190"/>
-                  <a:pt x="12930" y="-7393"/>
-                  <a:pt x="21600" y="14207"/>
-                </a:cubicBezTo>
-              </a:path>
-            </a:pathLst>
-          </a:custGeom>
-          <a:noFill/>
-          <a:ln w="88900" cap="flat">
-            <a:solidFill>
-              <a:schemeClr val="tx1"/>
-            </a:solidFill>
-            <a:prstDash val="solid"/>
-            <a:miter lim="800000"/>
-            <a:headEnd type="triangle" w="med" len="med"/>
-            <a:tailEnd type="triangle" w="med" len="med"/>
-          </a:ln>
-          <a:extLst>
-            <a:ext uri="{909E8E84-426E-40DD-AFC4-6F175D3DCCD1}">
-              <a14:hiddenFill xmlns:a14="http://schemas.microsoft.com/office/drawing/2010/main">
-                <a:solidFill>
-                  <a:srgbClr val="FFFFFF"/>
-                </a:solidFill>
-              </a14:hiddenFill>
-            </a:ext>
-          </a:extLst>
-        </p:spPr>
-        <p:txBody>
-          <a:bodyPr lIns="0" tIns="0" rIns="0" bIns="0"/>
-          <a:lstStyle/>
-          <a:p>
-            <a:endParaRPr lang="en-US"/>
-          </a:p>
-        </p:txBody>
-      </p:sp>
-      <p:sp>
-        <p:nvSpPr>
-          <p:cNvPr id="15" name="Freeform 11"/>
-          <p:cNvSpPr>
-            <a:spLocks/>
-          </p:cNvSpPr>
-          <p:nvPr/>
-        </p:nvSpPr>
-        <p:spPr bwMode="auto">
-          <a:xfrm>
-            <a:off x="7383463" y="742950"/>
-            <a:ext cx="3290887" cy="2003425"/>
-          </a:xfrm>
-          <a:custGeom>
-            <a:avLst/>
-            <a:gdLst>
-              <a:gd name="T0" fmla="*/ 0 w 21600"/>
-              <a:gd name="T1" fmla="*/ 2147483646 h 19084"/>
-              <a:gd name="T2" fmla="*/ 2147483646 w 21600"/>
-              <a:gd name="T3" fmla="*/ 2147483646 h 19084"/>
-              <a:gd name="T4" fmla="*/ 0 60000 65536"/>
-              <a:gd name="T5" fmla="*/ 0 60000 65536"/>
-            </a:gdLst>
-            <a:ahLst/>
-            <a:cxnLst>
-              <a:cxn ang="T4">
-                <a:pos x="T0" y="T1"/>
-              </a:cxn>
-              <a:cxn ang="T5">
-                <a:pos x="T2" y="T3"/>
-              </a:cxn>
-            </a:cxnLst>
-            <a:rect l="0" t="0" r="r" b="b"/>
-            <a:pathLst>
-              <a:path w="21600" h="19084">
-                <a:moveTo>
-                  <a:pt x="0" y="379"/>
-                </a:moveTo>
-                <a:cubicBezTo>
-                  <a:pt x="15167" y="-2516"/>
-                  <a:pt x="18505" y="11887"/>
-                  <a:pt x="21600" y="19084"/>
-                </a:cubicBezTo>
-              </a:path>
-            </a:pathLst>
-          </a:custGeom>
-          <a:noFill/>
-          <a:ln w="76200" cap="flat">
-            <a:solidFill>
-              <a:schemeClr val="tx1"/>
-            </a:solidFill>
-            <a:prstDash val="solid"/>
-            <a:miter lim="800000"/>
-            <a:headEnd type="triangle" w="med" len="med"/>
-            <a:tailEnd type="triangle" w="med" len="med"/>
-          </a:ln>
-          <a:extLst>
-            <a:ext uri="{909E8E84-426E-40DD-AFC4-6F175D3DCCD1}">
-              <a14:hiddenFill xmlns:a14="http://schemas.microsoft.com/office/drawing/2010/main">
-                <a:solidFill>
-                  <a:srgbClr val="FFFFFF"/>
-                </a:solidFill>
-              </a14:hiddenFill>
-            </a:ext>
-          </a:extLst>
-        </p:spPr>
-        <p:txBody>
-          <a:bodyPr lIns="0" tIns="0" rIns="0" bIns="0"/>
-          <a:lstStyle/>
-          <a:p>
-            <a:endParaRPr lang="en-US"/>
-          </a:p>
-        </p:txBody>
-      </p:sp>
-      <p:sp>
-        <p:nvSpPr>
-          <p:cNvPr id="16" name="Freeform 12"/>
-          <p:cNvSpPr>
-            <a:spLocks/>
-          </p:cNvSpPr>
-          <p:nvPr/>
-        </p:nvSpPr>
-        <p:spPr bwMode="auto">
-          <a:xfrm>
-            <a:off x="6070600" y="3722688"/>
-            <a:ext cx="4322763" cy="1970087"/>
-          </a:xfrm>
-          <a:custGeom>
-            <a:avLst/>
-            <a:gdLst>
-              <a:gd name="T0" fmla="*/ 0 w 21600"/>
-              <a:gd name="T1" fmla="*/ 2147483646 h 20168"/>
-              <a:gd name="T2" fmla="*/ 2147483646 w 21600"/>
-              <a:gd name="T3" fmla="*/ 0 h 20168"/>
-              <a:gd name="T4" fmla="*/ 0 60000 65536"/>
-              <a:gd name="T5" fmla="*/ 0 60000 65536"/>
-            </a:gdLst>
-            <a:ahLst/>
-            <a:cxnLst>
-              <a:cxn ang="T4">
-                <a:pos x="T0" y="T1"/>
-              </a:cxn>
-              <a:cxn ang="T5">
-                <a:pos x="T2" y="T3"/>
-              </a:cxn>
-            </a:cxnLst>
-            <a:rect l="0" t="0" r="r" b="b"/>
-            <a:pathLst>
-              <a:path w="21600" h="20168">
-                <a:moveTo>
-                  <a:pt x="0" y="19863"/>
-                </a:moveTo>
-                <a:cubicBezTo>
-                  <a:pt x="10090" y="21600"/>
-                  <a:pt x="15010" y="16057"/>
-                  <a:pt x="21600" y="0"/>
-                </a:cubicBezTo>
-              </a:path>
-            </a:pathLst>
-          </a:custGeom>
-          <a:noFill/>
-          <a:ln w="76200" cap="flat">
-            <a:solidFill>
-              <a:schemeClr val="tx1"/>
-            </a:solidFill>
-            <a:prstDash val="solid"/>
-            <a:miter lim="800000"/>
-            <a:headEnd type="triangle" w="med" len="med"/>
-            <a:tailEnd type="triangle" w="med" len="med"/>
-          </a:ln>
-          <a:extLst>
-            <a:ext uri="{909E8E84-426E-40DD-AFC4-6F175D3DCCD1}">
-              <a14:hiddenFill xmlns:a14="http://schemas.microsoft.com/office/drawing/2010/main">
-                <a:solidFill>
-                  <a:srgbClr val="FFFFFF"/>
-                </a:solidFill>
-              </a14:hiddenFill>
-            </a:ext>
-          </a:extLst>
-        </p:spPr>
-        <p:txBody>
-          <a:bodyPr lIns="0" tIns="0" rIns="0" bIns="0"/>
-          <a:lstStyle/>
-          <a:p>
-            <a:endParaRPr lang="en-US"/>
-          </a:p>
-        </p:txBody>
-      </p:sp>
-      <p:sp>
-        <p:nvSpPr>
-          <p:cNvPr id="17" name="Rectangle 13"/>
-          <p:cNvSpPr>
-            <a:spLocks/>
-          </p:cNvSpPr>
-          <p:nvPr/>
-        </p:nvSpPr>
-        <p:spPr bwMode="auto">
-          <a:xfrm>
-            <a:off x="3275013" y="152400"/>
-            <a:ext cx="357187" cy="660400"/>
-          </a:xfrm>
-          <a:prstGeom prst="rect">
-            <a:avLst/>
-          </a:prstGeom>
-          <a:noFill/>
-          <a:ln>
-            <a:noFill/>
-          </a:ln>
-          <a:extLst>
-            <a:ext uri="{909E8E84-426E-40DD-AFC4-6F175D3DCCD1}">
-              <a14:hiddenFill xmlns:a14="http://schemas.microsoft.com/office/drawing/2010/main">
-                <a:solidFill>
-                  <a:srgbClr val="FFFFFF"/>
-                </a:solidFill>
-              </a14:hiddenFill>
-            </a:ext>
-            <a:ext uri="{91240B29-F687-4F45-9708-019B960494DF}">
-              <a14:hiddenLine xmlns:a14="http://schemas.microsoft.com/office/drawing/2010/main" w="12700">
-                <a:solidFill>
-                  <a:schemeClr val="tx1"/>
-                </a:solidFill>
-                <a:miter lim="800000"/>
-                <a:headEnd/>
-                <a:tailEnd/>
-              </a14:hiddenLine>
-            </a:ext>
-          </a:extLst>
-        </p:spPr>
-        <p:txBody>
-          <a:bodyPr wrap="none" lIns="0" tIns="0" rIns="0" bIns="0" anchor="ctr">
+          <a:bodyPr wrap="none" rtlCol="0">
             <a:spAutoFit/>
           </a:bodyPr>
-          <a:lstStyle>
-            <a:lvl1pPr algn="ctr">
-              <a:defRPr sz="3800">
-                <a:solidFill>
-                  <a:srgbClr val="000000"/>
-                </a:solidFill>
-                <a:latin typeface="Gill Sans" pitchFamily="-84" charset="0"/>
-                <a:ea typeface="ヒラギノ角ゴ ProN W3" pitchFamily="-84" charset="-128"/>
-                <a:sym typeface="Gill Sans" pitchFamily="-84" charset="0"/>
-              </a:defRPr>
-            </a:lvl1pPr>
-            <a:lvl2pPr marL="742950" indent="-285750" algn="ctr">
-              <a:defRPr sz="3800">
-                <a:solidFill>
-                  <a:srgbClr val="000000"/>
-                </a:solidFill>
-                <a:latin typeface="Gill Sans" pitchFamily="-84" charset="0"/>
-                <a:ea typeface="ヒラギノ角ゴ ProN W3" pitchFamily="-84" charset="-128"/>
-                <a:sym typeface="Gill Sans" pitchFamily="-84" charset="0"/>
-              </a:defRPr>
-            </a:lvl2pPr>
-            <a:lvl3pPr marL="1143000" indent="-228600" algn="ctr">
-              <a:defRPr sz="3800">
-                <a:solidFill>
-                  <a:srgbClr val="000000"/>
-                </a:solidFill>
-                <a:latin typeface="Gill Sans" pitchFamily="-84" charset="0"/>
-                <a:ea typeface="ヒラギノ角ゴ ProN W3" pitchFamily="-84" charset="-128"/>
-                <a:sym typeface="Gill Sans" pitchFamily="-84" charset="0"/>
-              </a:defRPr>
-            </a:lvl3pPr>
-            <a:lvl4pPr marL="1600200" indent="-228600" algn="ctr">
-              <a:defRPr sz="3800">
-                <a:solidFill>
-                  <a:srgbClr val="000000"/>
-                </a:solidFill>
-                <a:latin typeface="Gill Sans" pitchFamily="-84" charset="0"/>
-                <a:ea typeface="ヒラギノ角ゴ ProN W3" pitchFamily="-84" charset="-128"/>
-                <a:sym typeface="Gill Sans" pitchFamily="-84" charset="0"/>
-              </a:defRPr>
-            </a:lvl4pPr>
-            <a:lvl5pPr marL="2057400" indent="-228600" algn="ctr">
-              <a:defRPr sz="3800">
-                <a:solidFill>
-                  <a:srgbClr val="000000"/>
-                </a:solidFill>
-                <a:latin typeface="Gill Sans" pitchFamily="-84" charset="0"/>
-                <a:ea typeface="ヒラギノ角ゴ ProN W3" pitchFamily="-84" charset="-128"/>
-                <a:sym typeface="Gill Sans" pitchFamily="-84" charset="0"/>
-              </a:defRPr>
-            </a:lvl5pPr>
-            <a:lvl6pPr marL="2514600" indent="-228600" algn="ctr" eaLnBrk="0" fontAlgn="base" hangingPunct="0">
-              <a:spcBef>
-                <a:spcPct val="0"/>
-              </a:spcBef>
-              <a:spcAft>
-                <a:spcPct val="0"/>
-              </a:spcAft>
-              <a:defRPr sz="3800">
-                <a:solidFill>
-                  <a:srgbClr val="000000"/>
-                </a:solidFill>
-                <a:latin typeface="Gill Sans" pitchFamily="-84" charset="0"/>
-                <a:ea typeface="ヒラギノ角ゴ ProN W3" pitchFamily="-84" charset="-128"/>
-                <a:sym typeface="Gill Sans" pitchFamily="-84" charset="0"/>
-              </a:defRPr>
-            </a:lvl6pPr>
-            <a:lvl7pPr marL="2971800" indent="-228600" algn="ctr" eaLnBrk="0" fontAlgn="base" hangingPunct="0">
-              <a:spcBef>
-                <a:spcPct val="0"/>
-              </a:spcBef>
-              <a:spcAft>
-                <a:spcPct val="0"/>
-              </a:spcAft>
-              <a:defRPr sz="3800">
-                <a:solidFill>
-                  <a:srgbClr val="000000"/>
-                </a:solidFill>
-                <a:latin typeface="Gill Sans" pitchFamily="-84" charset="0"/>
-                <a:ea typeface="ヒラギノ角ゴ ProN W3" pitchFamily="-84" charset="-128"/>
-                <a:sym typeface="Gill Sans" pitchFamily="-84" charset="0"/>
-              </a:defRPr>
-            </a:lvl7pPr>
-            <a:lvl8pPr marL="3429000" indent="-228600" algn="ctr" eaLnBrk="0" fontAlgn="base" hangingPunct="0">
-              <a:spcBef>
-                <a:spcPct val="0"/>
-              </a:spcBef>
-              <a:spcAft>
-                <a:spcPct val="0"/>
-              </a:spcAft>
-              <a:defRPr sz="3800">
-                <a:solidFill>
-                  <a:srgbClr val="000000"/>
-                </a:solidFill>
-                <a:latin typeface="Gill Sans" pitchFamily="-84" charset="0"/>
-                <a:ea typeface="ヒラギノ角ゴ ProN W3" pitchFamily="-84" charset="-128"/>
-                <a:sym typeface="Gill Sans" pitchFamily="-84" charset="0"/>
-              </a:defRPr>
-            </a:lvl8pPr>
-            <a:lvl9pPr marL="3886200" indent="-228600" algn="ctr" eaLnBrk="0" fontAlgn="base" hangingPunct="0">
-              <a:spcBef>
-                <a:spcPct val="0"/>
-              </a:spcBef>
-              <a:spcAft>
-                <a:spcPct val="0"/>
-              </a:spcAft>
-              <a:defRPr sz="3800">
-                <a:solidFill>
-                  <a:srgbClr val="000000"/>
-                </a:solidFill>
-                <a:latin typeface="Gill Sans" pitchFamily="-84" charset="0"/>
-                <a:ea typeface="ヒラギノ角ゴ ProN W3" pitchFamily="-84" charset="-128"/>
-                <a:sym typeface="Gill Sans" pitchFamily="-84" charset="0"/>
-              </a:defRPr>
-            </a:lvl9pPr>
-          </a:lstStyle>
-          <a:p>
-            <a:pPr eaLnBrk="1" hangingPunct="1"/>
-            <a:r>
-              <a:rPr lang="en-US" altLang="en-US">
-                <a:solidFill>
-                  <a:schemeClr val="tx1"/>
-                </a:solidFill>
-                <a:latin typeface="Helvetica" panose="020B0604020202020204" pitchFamily="34" charset="0"/>
-                <a:ea typeface="ＭＳ Ｐゴシック" pitchFamily="-84" charset="-128"/>
-                <a:sym typeface="Helvetica" panose="020B0604020202020204" pitchFamily="34" charset="0"/>
-              </a:rPr>
-              <a:t>1</a:t>
-            </a:r>
-          </a:p>
-        </p:txBody>
-      </p:sp>
-      <p:sp>
-        <p:nvSpPr>
-          <p:cNvPr id="18" name="Rectangle 14"/>
-          <p:cNvSpPr>
-            <a:spLocks/>
-          </p:cNvSpPr>
-          <p:nvPr/>
-        </p:nvSpPr>
-        <p:spPr bwMode="auto">
-          <a:xfrm>
-            <a:off x="5816600" y="1879600"/>
-            <a:ext cx="357188" cy="660400"/>
-          </a:xfrm>
-          <a:prstGeom prst="rect">
-            <a:avLst/>
-          </a:prstGeom>
-          <a:noFill/>
-          <a:ln>
-            <a:noFill/>
-          </a:ln>
-          <a:extLst>
-            <a:ext uri="{909E8E84-426E-40DD-AFC4-6F175D3DCCD1}">
-              <a14:hiddenFill xmlns:a14="http://schemas.microsoft.com/office/drawing/2010/main">
-                <a:solidFill>
-                  <a:srgbClr val="FFFFFF"/>
-                </a:solidFill>
-              </a14:hiddenFill>
-            </a:ext>
-            <a:ext uri="{91240B29-F687-4F45-9708-019B960494DF}">
-              <a14:hiddenLine xmlns:a14="http://schemas.microsoft.com/office/drawing/2010/main" w="12700">
-                <a:solidFill>
-                  <a:schemeClr val="tx1"/>
-                </a:solidFill>
-                <a:miter lim="800000"/>
-                <a:headEnd/>
-                <a:tailEnd/>
-              </a14:hiddenLine>
-            </a:ext>
-          </a:extLst>
-        </p:spPr>
-        <p:txBody>
-          <a:bodyPr wrap="none" lIns="0" tIns="0" rIns="0" bIns="0" anchor="ctr">
-            <a:spAutoFit/>
-          </a:bodyPr>
-          <a:lstStyle>
-            <a:lvl1pPr algn="ctr">
-              <a:defRPr sz="3800">
-                <a:solidFill>
-                  <a:srgbClr val="000000"/>
-                </a:solidFill>
-                <a:latin typeface="Gill Sans" pitchFamily="-84" charset="0"/>
-                <a:ea typeface="ヒラギノ角ゴ ProN W3" pitchFamily="-84" charset="-128"/>
-                <a:sym typeface="Gill Sans" pitchFamily="-84" charset="0"/>
-              </a:defRPr>
-            </a:lvl1pPr>
-            <a:lvl2pPr marL="742950" indent="-285750" algn="ctr">
-              <a:defRPr sz="3800">
-                <a:solidFill>
-                  <a:srgbClr val="000000"/>
-                </a:solidFill>
-                <a:latin typeface="Gill Sans" pitchFamily="-84" charset="0"/>
-                <a:ea typeface="ヒラギノ角ゴ ProN W3" pitchFamily="-84" charset="-128"/>
-                <a:sym typeface="Gill Sans" pitchFamily="-84" charset="0"/>
-              </a:defRPr>
-            </a:lvl2pPr>
-            <a:lvl3pPr marL="1143000" indent="-228600" algn="ctr">
-              <a:defRPr sz="3800">
-                <a:solidFill>
-                  <a:srgbClr val="000000"/>
-                </a:solidFill>
-                <a:latin typeface="Gill Sans" pitchFamily="-84" charset="0"/>
-                <a:ea typeface="ヒラギノ角ゴ ProN W3" pitchFamily="-84" charset="-128"/>
-                <a:sym typeface="Gill Sans" pitchFamily="-84" charset="0"/>
-              </a:defRPr>
-            </a:lvl3pPr>
-            <a:lvl4pPr marL="1600200" indent="-228600" algn="ctr">
-              <a:defRPr sz="3800">
-                <a:solidFill>
-                  <a:srgbClr val="000000"/>
-                </a:solidFill>
-                <a:latin typeface="Gill Sans" pitchFamily="-84" charset="0"/>
-                <a:ea typeface="ヒラギノ角ゴ ProN W3" pitchFamily="-84" charset="-128"/>
-                <a:sym typeface="Gill Sans" pitchFamily="-84" charset="0"/>
-              </a:defRPr>
-            </a:lvl4pPr>
-            <a:lvl5pPr marL="2057400" indent="-228600" algn="ctr">
-              <a:defRPr sz="3800">
-                <a:solidFill>
-                  <a:srgbClr val="000000"/>
-                </a:solidFill>
-                <a:latin typeface="Gill Sans" pitchFamily="-84" charset="0"/>
-                <a:ea typeface="ヒラギノ角ゴ ProN W3" pitchFamily="-84" charset="-128"/>
-                <a:sym typeface="Gill Sans" pitchFamily="-84" charset="0"/>
-              </a:defRPr>
-            </a:lvl5pPr>
-            <a:lvl6pPr marL="2514600" indent="-228600" algn="ctr" eaLnBrk="0" fontAlgn="base" hangingPunct="0">
-              <a:spcBef>
-                <a:spcPct val="0"/>
-              </a:spcBef>
-              <a:spcAft>
-                <a:spcPct val="0"/>
-              </a:spcAft>
-              <a:defRPr sz="3800">
-                <a:solidFill>
-                  <a:srgbClr val="000000"/>
-                </a:solidFill>
-                <a:latin typeface="Gill Sans" pitchFamily="-84" charset="0"/>
-                <a:ea typeface="ヒラギノ角ゴ ProN W3" pitchFamily="-84" charset="-128"/>
-                <a:sym typeface="Gill Sans" pitchFamily="-84" charset="0"/>
-              </a:defRPr>
-            </a:lvl6pPr>
-            <a:lvl7pPr marL="2971800" indent="-228600" algn="ctr" eaLnBrk="0" fontAlgn="base" hangingPunct="0">
-              <a:spcBef>
-                <a:spcPct val="0"/>
-              </a:spcBef>
-              <a:spcAft>
-                <a:spcPct val="0"/>
-              </a:spcAft>
-              <a:defRPr sz="3800">
-                <a:solidFill>
-                  <a:srgbClr val="000000"/>
-                </a:solidFill>
-                <a:latin typeface="Gill Sans" pitchFamily="-84" charset="0"/>
-                <a:ea typeface="ヒラギノ角ゴ ProN W3" pitchFamily="-84" charset="-128"/>
-                <a:sym typeface="Gill Sans" pitchFamily="-84" charset="0"/>
-              </a:defRPr>
-            </a:lvl7pPr>
-            <a:lvl8pPr marL="3429000" indent="-228600" algn="ctr" eaLnBrk="0" fontAlgn="base" hangingPunct="0">
-              <a:spcBef>
-                <a:spcPct val="0"/>
-              </a:spcBef>
-              <a:spcAft>
-                <a:spcPct val="0"/>
-              </a:spcAft>
-              <a:defRPr sz="3800">
-                <a:solidFill>
-                  <a:srgbClr val="000000"/>
-                </a:solidFill>
-                <a:latin typeface="Gill Sans" pitchFamily="-84" charset="0"/>
-                <a:ea typeface="ヒラギノ角ゴ ProN W3" pitchFamily="-84" charset="-128"/>
-                <a:sym typeface="Gill Sans" pitchFamily="-84" charset="0"/>
-              </a:defRPr>
-            </a:lvl8pPr>
-            <a:lvl9pPr marL="3886200" indent="-228600" algn="ctr" eaLnBrk="0" fontAlgn="base" hangingPunct="0">
-              <a:spcBef>
-                <a:spcPct val="0"/>
-              </a:spcBef>
-              <a:spcAft>
-                <a:spcPct val="0"/>
-              </a:spcAft>
-              <a:defRPr sz="3800">
-                <a:solidFill>
-                  <a:srgbClr val="000000"/>
-                </a:solidFill>
-                <a:latin typeface="Gill Sans" pitchFamily="-84" charset="0"/>
-                <a:ea typeface="ヒラギノ角ゴ ProN W3" pitchFamily="-84" charset="-128"/>
-                <a:sym typeface="Gill Sans" pitchFamily="-84" charset="0"/>
-              </a:defRPr>
-            </a:lvl9pPr>
-          </a:lstStyle>
-          <a:p>
-            <a:pPr eaLnBrk="1" hangingPunct="1"/>
-            <a:r>
-              <a:rPr lang="en-US" altLang="en-US">
-                <a:solidFill>
-                  <a:schemeClr val="tx1"/>
-                </a:solidFill>
-                <a:latin typeface="Helvetica" panose="020B0604020202020204" pitchFamily="34" charset="0"/>
-                <a:ea typeface="ＭＳ Ｐゴシック" pitchFamily="-84" charset="-128"/>
-                <a:sym typeface="Helvetica" panose="020B0604020202020204" pitchFamily="34" charset="0"/>
-              </a:rPr>
-              <a:t>2</a:t>
-            </a:r>
-          </a:p>
-        </p:txBody>
-      </p:sp>
-      <p:sp>
-        <p:nvSpPr>
-          <p:cNvPr id="19" name="Rectangle 15"/>
-          <p:cNvSpPr>
-            <a:spLocks/>
-          </p:cNvSpPr>
-          <p:nvPr/>
-        </p:nvSpPr>
-        <p:spPr bwMode="auto">
-          <a:xfrm>
-            <a:off x="7061200" y="2768600"/>
-            <a:ext cx="357188" cy="660400"/>
-          </a:xfrm>
-          <a:prstGeom prst="rect">
-            <a:avLst/>
-          </a:prstGeom>
-          <a:noFill/>
-          <a:ln>
-            <a:noFill/>
-          </a:ln>
-          <a:extLst>
-            <a:ext uri="{909E8E84-426E-40DD-AFC4-6F175D3DCCD1}">
-              <a14:hiddenFill xmlns:a14="http://schemas.microsoft.com/office/drawing/2010/main">
-                <a:solidFill>
-                  <a:srgbClr val="FFFFFF"/>
-                </a:solidFill>
-              </a14:hiddenFill>
-            </a:ext>
-            <a:ext uri="{91240B29-F687-4F45-9708-019B960494DF}">
-              <a14:hiddenLine xmlns:a14="http://schemas.microsoft.com/office/drawing/2010/main" w="12700">
-                <a:solidFill>
-                  <a:schemeClr val="tx1"/>
-                </a:solidFill>
-                <a:miter lim="800000"/>
-                <a:headEnd/>
-                <a:tailEnd/>
-              </a14:hiddenLine>
-            </a:ext>
-          </a:extLst>
-        </p:spPr>
-        <p:txBody>
-          <a:bodyPr wrap="none" lIns="0" tIns="0" rIns="0" bIns="0" anchor="ctr">
-            <a:spAutoFit/>
-          </a:bodyPr>
-          <a:lstStyle>
-            <a:lvl1pPr algn="ctr">
-              <a:defRPr sz="3800">
-                <a:solidFill>
-                  <a:srgbClr val="000000"/>
-                </a:solidFill>
-                <a:latin typeface="Gill Sans" pitchFamily="-84" charset="0"/>
-                <a:ea typeface="ヒラギノ角ゴ ProN W3" pitchFamily="-84" charset="-128"/>
-                <a:sym typeface="Gill Sans" pitchFamily="-84" charset="0"/>
-              </a:defRPr>
-            </a:lvl1pPr>
-            <a:lvl2pPr marL="742950" indent="-285750" algn="ctr">
-              <a:defRPr sz="3800">
-                <a:solidFill>
-                  <a:srgbClr val="000000"/>
-                </a:solidFill>
-                <a:latin typeface="Gill Sans" pitchFamily="-84" charset="0"/>
-                <a:ea typeface="ヒラギノ角ゴ ProN W3" pitchFamily="-84" charset="-128"/>
-                <a:sym typeface="Gill Sans" pitchFamily="-84" charset="0"/>
-              </a:defRPr>
-            </a:lvl2pPr>
-            <a:lvl3pPr marL="1143000" indent="-228600" algn="ctr">
-              <a:defRPr sz="3800">
-                <a:solidFill>
-                  <a:srgbClr val="000000"/>
-                </a:solidFill>
-                <a:latin typeface="Gill Sans" pitchFamily="-84" charset="0"/>
-                <a:ea typeface="ヒラギノ角ゴ ProN W3" pitchFamily="-84" charset="-128"/>
-                <a:sym typeface="Gill Sans" pitchFamily="-84" charset="0"/>
-              </a:defRPr>
-            </a:lvl3pPr>
-            <a:lvl4pPr marL="1600200" indent="-228600" algn="ctr">
-              <a:defRPr sz="3800">
-                <a:solidFill>
-                  <a:srgbClr val="000000"/>
-                </a:solidFill>
-                <a:latin typeface="Gill Sans" pitchFamily="-84" charset="0"/>
-                <a:ea typeface="ヒラギノ角ゴ ProN W3" pitchFamily="-84" charset="-128"/>
-                <a:sym typeface="Gill Sans" pitchFamily="-84" charset="0"/>
-              </a:defRPr>
-            </a:lvl4pPr>
-            <a:lvl5pPr marL="2057400" indent="-228600" algn="ctr">
-              <a:defRPr sz="3800">
-                <a:solidFill>
-                  <a:srgbClr val="000000"/>
-                </a:solidFill>
-                <a:latin typeface="Gill Sans" pitchFamily="-84" charset="0"/>
-                <a:ea typeface="ヒラギノ角ゴ ProN W3" pitchFamily="-84" charset="-128"/>
-                <a:sym typeface="Gill Sans" pitchFamily="-84" charset="0"/>
-              </a:defRPr>
-            </a:lvl5pPr>
-            <a:lvl6pPr marL="2514600" indent="-228600" algn="ctr" eaLnBrk="0" fontAlgn="base" hangingPunct="0">
-              <a:spcBef>
-                <a:spcPct val="0"/>
-              </a:spcBef>
-              <a:spcAft>
-                <a:spcPct val="0"/>
-              </a:spcAft>
-              <a:defRPr sz="3800">
-                <a:solidFill>
-                  <a:srgbClr val="000000"/>
-                </a:solidFill>
-                <a:latin typeface="Gill Sans" pitchFamily="-84" charset="0"/>
-                <a:ea typeface="ヒラギノ角ゴ ProN W3" pitchFamily="-84" charset="-128"/>
-                <a:sym typeface="Gill Sans" pitchFamily="-84" charset="0"/>
-              </a:defRPr>
-            </a:lvl6pPr>
-            <a:lvl7pPr marL="2971800" indent="-228600" algn="ctr" eaLnBrk="0" fontAlgn="base" hangingPunct="0">
-              <a:spcBef>
-                <a:spcPct val="0"/>
-              </a:spcBef>
-              <a:spcAft>
-                <a:spcPct val="0"/>
-              </a:spcAft>
-              <a:defRPr sz="3800">
-                <a:solidFill>
-                  <a:srgbClr val="000000"/>
-                </a:solidFill>
-                <a:latin typeface="Gill Sans" pitchFamily="-84" charset="0"/>
-                <a:ea typeface="ヒラギノ角ゴ ProN W3" pitchFamily="-84" charset="-128"/>
-                <a:sym typeface="Gill Sans" pitchFamily="-84" charset="0"/>
-              </a:defRPr>
-            </a:lvl7pPr>
-            <a:lvl8pPr marL="3429000" indent="-228600" algn="ctr" eaLnBrk="0" fontAlgn="base" hangingPunct="0">
-              <a:spcBef>
-                <a:spcPct val="0"/>
-              </a:spcBef>
-              <a:spcAft>
-                <a:spcPct val="0"/>
-              </a:spcAft>
-              <a:defRPr sz="3800">
-                <a:solidFill>
-                  <a:srgbClr val="000000"/>
-                </a:solidFill>
-                <a:latin typeface="Gill Sans" pitchFamily="-84" charset="0"/>
-                <a:ea typeface="ヒラギノ角ゴ ProN W3" pitchFamily="-84" charset="-128"/>
-                <a:sym typeface="Gill Sans" pitchFamily="-84" charset="0"/>
-              </a:defRPr>
-            </a:lvl8pPr>
-            <a:lvl9pPr marL="3886200" indent="-228600" algn="ctr" eaLnBrk="0" fontAlgn="base" hangingPunct="0">
-              <a:spcBef>
-                <a:spcPct val="0"/>
-              </a:spcBef>
-              <a:spcAft>
-                <a:spcPct val="0"/>
-              </a:spcAft>
-              <a:defRPr sz="3800">
-                <a:solidFill>
-                  <a:srgbClr val="000000"/>
-                </a:solidFill>
-                <a:latin typeface="Gill Sans" pitchFamily="-84" charset="0"/>
-                <a:ea typeface="ヒラギノ角ゴ ProN W3" pitchFamily="-84" charset="-128"/>
-                <a:sym typeface="Gill Sans" pitchFamily="-84" charset="0"/>
-              </a:defRPr>
-            </a:lvl9pPr>
-          </a:lstStyle>
-          <a:p>
-            <a:pPr eaLnBrk="1" hangingPunct="1"/>
-            <a:r>
-              <a:rPr lang="en-US" altLang="en-US">
-                <a:solidFill>
-                  <a:schemeClr val="tx1"/>
-                </a:solidFill>
-                <a:latin typeface="Helvetica" panose="020B0604020202020204" pitchFamily="34" charset="0"/>
-                <a:ea typeface="ＭＳ Ｐゴシック" pitchFamily="-84" charset="-128"/>
-                <a:sym typeface="Helvetica" panose="020B0604020202020204" pitchFamily="34" charset="0"/>
-              </a:rPr>
-              <a:t>3</a:t>
-            </a:r>
-          </a:p>
-        </p:txBody>
-      </p:sp>
-      <p:sp>
-        <p:nvSpPr>
-          <p:cNvPr id="20" name="Rectangle 16"/>
-          <p:cNvSpPr>
-            <a:spLocks/>
-          </p:cNvSpPr>
-          <p:nvPr/>
-        </p:nvSpPr>
-        <p:spPr bwMode="auto">
-          <a:xfrm>
-            <a:off x="9042400" y="990600"/>
-            <a:ext cx="357188" cy="660400"/>
-          </a:xfrm>
-          <a:prstGeom prst="rect">
-            <a:avLst/>
-          </a:prstGeom>
-          <a:noFill/>
-          <a:ln>
-            <a:noFill/>
-          </a:ln>
-          <a:extLst>
-            <a:ext uri="{909E8E84-426E-40DD-AFC4-6F175D3DCCD1}">
-              <a14:hiddenFill xmlns:a14="http://schemas.microsoft.com/office/drawing/2010/main">
-                <a:solidFill>
-                  <a:srgbClr val="FFFFFF"/>
-                </a:solidFill>
-              </a14:hiddenFill>
-            </a:ext>
-            <a:ext uri="{91240B29-F687-4F45-9708-019B960494DF}">
-              <a14:hiddenLine xmlns:a14="http://schemas.microsoft.com/office/drawing/2010/main" w="12700">
-                <a:solidFill>
-                  <a:schemeClr val="tx1"/>
-                </a:solidFill>
-                <a:miter lim="800000"/>
-                <a:headEnd/>
-                <a:tailEnd/>
-              </a14:hiddenLine>
-            </a:ext>
-          </a:extLst>
-        </p:spPr>
-        <p:txBody>
-          <a:bodyPr wrap="none" lIns="0" tIns="0" rIns="0" bIns="0" anchor="ctr">
-            <a:spAutoFit/>
-          </a:bodyPr>
-          <a:lstStyle>
-            <a:lvl1pPr algn="ctr">
-              <a:defRPr sz="3800">
-                <a:solidFill>
-                  <a:srgbClr val="000000"/>
-                </a:solidFill>
-                <a:latin typeface="Gill Sans" pitchFamily="-84" charset="0"/>
-                <a:ea typeface="ヒラギノ角ゴ ProN W3" pitchFamily="-84" charset="-128"/>
-                <a:sym typeface="Gill Sans" pitchFamily="-84" charset="0"/>
-              </a:defRPr>
-            </a:lvl1pPr>
-            <a:lvl2pPr marL="742950" indent="-285750" algn="ctr">
-              <a:defRPr sz="3800">
-                <a:solidFill>
-                  <a:srgbClr val="000000"/>
-                </a:solidFill>
-                <a:latin typeface="Gill Sans" pitchFamily="-84" charset="0"/>
-                <a:ea typeface="ヒラギノ角ゴ ProN W3" pitchFamily="-84" charset="-128"/>
-                <a:sym typeface="Gill Sans" pitchFamily="-84" charset="0"/>
-              </a:defRPr>
-            </a:lvl2pPr>
-            <a:lvl3pPr marL="1143000" indent="-228600" algn="ctr">
-              <a:defRPr sz="3800">
-                <a:solidFill>
-                  <a:srgbClr val="000000"/>
-                </a:solidFill>
-                <a:latin typeface="Gill Sans" pitchFamily="-84" charset="0"/>
-                <a:ea typeface="ヒラギノ角ゴ ProN W3" pitchFamily="-84" charset="-128"/>
-                <a:sym typeface="Gill Sans" pitchFamily="-84" charset="0"/>
-              </a:defRPr>
-            </a:lvl3pPr>
-            <a:lvl4pPr marL="1600200" indent="-228600" algn="ctr">
-              <a:defRPr sz="3800">
-                <a:solidFill>
-                  <a:srgbClr val="000000"/>
-                </a:solidFill>
-                <a:latin typeface="Gill Sans" pitchFamily="-84" charset="0"/>
-                <a:ea typeface="ヒラギノ角ゴ ProN W3" pitchFamily="-84" charset="-128"/>
-                <a:sym typeface="Gill Sans" pitchFamily="-84" charset="0"/>
-              </a:defRPr>
-            </a:lvl4pPr>
-            <a:lvl5pPr marL="2057400" indent="-228600" algn="ctr">
-              <a:defRPr sz="3800">
-                <a:solidFill>
-                  <a:srgbClr val="000000"/>
-                </a:solidFill>
-                <a:latin typeface="Gill Sans" pitchFamily="-84" charset="0"/>
-                <a:ea typeface="ヒラギノ角ゴ ProN W3" pitchFamily="-84" charset="-128"/>
-                <a:sym typeface="Gill Sans" pitchFamily="-84" charset="0"/>
-              </a:defRPr>
-            </a:lvl5pPr>
-            <a:lvl6pPr marL="2514600" indent="-228600" algn="ctr" eaLnBrk="0" fontAlgn="base" hangingPunct="0">
-              <a:spcBef>
-                <a:spcPct val="0"/>
-              </a:spcBef>
-              <a:spcAft>
-                <a:spcPct val="0"/>
-              </a:spcAft>
-              <a:defRPr sz="3800">
-                <a:solidFill>
-                  <a:srgbClr val="000000"/>
-                </a:solidFill>
-                <a:latin typeface="Gill Sans" pitchFamily="-84" charset="0"/>
-                <a:ea typeface="ヒラギノ角ゴ ProN W3" pitchFamily="-84" charset="-128"/>
-                <a:sym typeface="Gill Sans" pitchFamily="-84" charset="0"/>
-              </a:defRPr>
-            </a:lvl6pPr>
-            <a:lvl7pPr marL="2971800" indent="-228600" algn="ctr" eaLnBrk="0" fontAlgn="base" hangingPunct="0">
-              <a:spcBef>
-                <a:spcPct val="0"/>
-              </a:spcBef>
-              <a:spcAft>
-                <a:spcPct val="0"/>
-              </a:spcAft>
-              <a:defRPr sz="3800">
-                <a:solidFill>
-                  <a:srgbClr val="000000"/>
-                </a:solidFill>
-                <a:latin typeface="Gill Sans" pitchFamily="-84" charset="0"/>
-                <a:ea typeface="ヒラギノ角ゴ ProN W3" pitchFamily="-84" charset="-128"/>
-                <a:sym typeface="Gill Sans" pitchFamily="-84" charset="0"/>
-              </a:defRPr>
-            </a:lvl7pPr>
-            <a:lvl8pPr marL="3429000" indent="-228600" algn="ctr" eaLnBrk="0" fontAlgn="base" hangingPunct="0">
-              <a:spcBef>
-                <a:spcPct val="0"/>
-              </a:spcBef>
-              <a:spcAft>
-                <a:spcPct val="0"/>
-              </a:spcAft>
-              <a:defRPr sz="3800">
-                <a:solidFill>
-                  <a:srgbClr val="000000"/>
-                </a:solidFill>
-                <a:latin typeface="Gill Sans" pitchFamily="-84" charset="0"/>
-                <a:ea typeface="ヒラギノ角ゴ ProN W3" pitchFamily="-84" charset="-128"/>
-                <a:sym typeface="Gill Sans" pitchFamily="-84" charset="0"/>
-              </a:defRPr>
-            </a:lvl8pPr>
-            <a:lvl9pPr marL="3886200" indent="-228600" algn="ctr" eaLnBrk="0" fontAlgn="base" hangingPunct="0">
-              <a:spcBef>
-                <a:spcPct val="0"/>
-              </a:spcBef>
-              <a:spcAft>
-                <a:spcPct val="0"/>
-              </a:spcAft>
-              <a:defRPr sz="3800">
-                <a:solidFill>
-                  <a:srgbClr val="000000"/>
-                </a:solidFill>
-                <a:latin typeface="Gill Sans" pitchFamily="-84" charset="0"/>
-                <a:ea typeface="ヒラギノ角ゴ ProN W3" pitchFamily="-84" charset="-128"/>
-                <a:sym typeface="Gill Sans" pitchFamily="-84" charset="0"/>
-              </a:defRPr>
-            </a:lvl9pPr>
-          </a:lstStyle>
-          <a:p>
-            <a:pPr eaLnBrk="1" hangingPunct="1"/>
-            <a:r>
-              <a:rPr lang="en-US" altLang="en-US">
-                <a:solidFill>
-                  <a:schemeClr val="tx1"/>
-                </a:solidFill>
-                <a:latin typeface="Helvetica" panose="020B0604020202020204" pitchFamily="34" charset="0"/>
-                <a:ea typeface="ＭＳ Ｐゴシック" pitchFamily="-84" charset="-128"/>
-                <a:sym typeface="Helvetica" panose="020B0604020202020204" pitchFamily="34" charset="0"/>
-              </a:rPr>
-              <a:t>4</a:t>
-            </a:r>
-          </a:p>
-        </p:txBody>
-      </p:sp>
-      <p:sp>
-        <p:nvSpPr>
-          <p:cNvPr id="21" name="Rectangle 17"/>
-          <p:cNvSpPr>
-            <a:spLocks/>
-          </p:cNvSpPr>
-          <p:nvPr/>
-        </p:nvSpPr>
-        <p:spPr bwMode="auto">
-          <a:xfrm>
-            <a:off x="8229600" y="4622800"/>
-            <a:ext cx="357188" cy="660400"/>
-          </a:xfrm>
-          <a:prstGeom prst="rect">
-            <a:avLst/>
-          </a:prstGeom>
-          <a:noFill/>
-          <a:ln>
-            <a:noFill/>
-          </a:ln>
-          <a:extLst>
-            <a:ext uri="{909E8E84-426E-40DD-AFC4-6F175D3DCCD1}">
-              <a14:hiddenFill xmlns:a14="http://schemas.microsoft.com/office/drawing/2010/main">
-                <a:solidFill>
-                  <a:srgbClr val="FFFFFF"/>
-                </a:solidFill>
-              </a14:hiddenFill>
-            </a:ext>
-            <a:ext uri="{91240B29-F687-4F45-9708-019B960494DF}">
-              <a14:hiddenLine xmlns:a14="http://schemas.microsoft.com/office/drawing/2010/main" w="12700">
-                <a:solidFill>
-                  <a:schemeClr val="tx1"/>
-                </a:solidFill>
-                <a:miter lim="800000"/>
-                <a:headEnd/>
-                <a:tailEnd/>
-              </a14:hiddenLine>
-            </a:ext>
-          </a:extLst>
-        </p:spPr>
-        <p:txBody>
-          <a:bodyPr wrap="none" lIns="0" tIns="0" rIns="0" bIns="0" anchor="ctr">
-            <a:spAutoFit/>
-          </a:bodyPr>
-          <a:lstStyle>
-            <a:lvl1pPr algn="ctr">
-              <a:defRPr sz="3800">
-                <a:solidFill>
-                  <a:srgbClr val="000000"/>
-                </a:solidFill>
-                <a:latin typeface="Gill Sans" pitchFamily="-84" charset="0"/>
-                <a:ea typeface="ヒラギノ角ゴ ProN W3" pitchFamily="-84" charset="-128"/>
-                <a:sym typeface="Gill Sans" pitchFamily="-84" charset="0"/>
-              </a:defRPr>
-            </a:lvl1pPr>
-            <a:lvl2pPr marL="742950" indent="-285750" algn="ctr">
-              <a:defRPr sz="3800">
-                <a:solidFill>
-                  <a:srgbClr val="000000"/>
-                </a:solidFill>
-                <a:latin typeface="Gill Sans" pitchFamily="-84" charset="0"/>
-                <a:ea typeface="ヒラギノ角ゴ ProN W3" pitchFamily="-84" charset="-128"/>
-                <a:sym typeface="Gill Sans" pitchFamily="-84" charset="0"/>
-              </a:defRPr>
-            </a:lvl2pPr>
-            <a:lvl3pPr marL="1143000" indent="-228600" algn="ctr">
-              <a:defRPr sz="3800">
-                <a:solidFill>
-                  <a:srgbClr val="000000"/>
-                </a:solidFill>
-                <a:latin typeface="Gill Sans" pitchFamily="-84" charset="0"/>
-                <a:ea typeface="ヒラギノ角ゴ ProN W3" pitchFamily="-84" charset="-128"/>
-                <a:sym typeface="Gill Sans" pitchFamily="-84" charset="0"/>
-              </a:defRPr>
-            </a:lvl3pPr>
-            <a:lvl4pPr marL="1600200" indent="-228600" algn="ctr">
-              <a:defRPr sz="3800">
-                <a:solidFill>
-                  <a:srgbClr val="000000"/>
-                </a:solidFill>
-                <a:latin typeface="Gill Sans" pitchFamily="-84" charset="0"/>
-                <a:ea typeface="ヒラギノ角ゴ ProN W3" pitchFamily="-84" charset="-128"/>
-                <a:sym typeface="Gill Sans" pitchFamily="-84" charset="0"/>
-              </a:defRPr>
-            </a:lvl4pPr>
-            <a:lvl5pPr marL="2057400" indent="-228600" algn="ctr">
-              <a:defRPr sz="3800">
-                <a:solidFill>
-                  <a:srgbClr val="000000"/>
-                </a:solidFill>
-                <a:latin typeface="Gill Sans" pitchFamily="-84" charset="0"/>
-                <a:ea typeface="ヒラギノ角ゴ ProN W3" pitchFamily="-84" charset="-128"/>
-                <a:sym typeface="Gill Sans" pitchFamily="-84" charset="0"/>
-              </a:defRPr>
-            </a:lvl5pPr>
-            <a:lvl6pPr marL="2514600" indent="-228600" algn="ctr" eaLnBrk="0" fontAlgn="base" hangingPunct="0">
-              <a:spcBef>
-                <a:spcPct val="0"/>
-              </a:spcBef>
-              <a:spcAft>
-                <a:spcPct val="0"/>
-              </a:spcAft>
-              <a:defRPr sz="3800">
-                <a:solidFill>
-                  <a:srgbClr val="000000"/>
-                </a:solidFill>
-                <a:latin typeface="Gill Sans" pitchFamily="-84" charset="0"/>
-                <a:ea typeface="ヒラギノ角ゴ ProN W3" pitchFamily="-84" charset="-128"/>
-                <a:sym typeface="Gill Sans" pitchFamily="-84" charset="0"/>
-              </a:defRPr>
-            </a:lvl6pPr>
-            <a:lvl7pPr marL="2971800" indent="-228600" algn="ctr" eaLnBrk="0" fontAlgn="base" hangingPunct="0">
-              <a:spcBef>
-                <a:spcPct val="0"/>
-              </a:spcBef>
-              <a:spcAft>
-                <a:spcPct val="0"/>
-              </a:spcAft>
-              <a:defRPr sz="3800">
-                <a:solidFill>
-                  <a:srgbClr val="000000"/>
-                </a:solidFill>
-                <a:latin typeface="Gill Sans" pitchFamily="-84" charset="0"/>
-                <a:ea typeface="ヒラギノ角ゴ ProN W3" pitchFamily="-84" charset="-128"/>
-                <a:sym typeface="Gill Sans" pitchFamily="-84" charset="0"/>
-              </a:defRPr>
-            </a:lvl7pPr>
-            <a:lvl8pPr marL="3429000" indent="-228600" algn="ctr" eaLnBrk="0" fontAlgn="base" hangingPunct="0">
-              <a:spcBef>
-                <a:spcPct val="0"/>
-              </a:spcBef>
-              <a:spcAft>
-                <a:spcPct val="0"/>
-              </a:spcAft>
-              <a:defRPr sz="3800">
-                <a:solidFill>
-                  <a:srgbClr val="000000"/>
-                </a:solidFill>
-                <a:latin typeface="Gill Sans" pitchFamily="-84" charset="0"/>
-                <a:ea typeface="ヒラギノ角ゴ ProN W3" pitchFamily="-84" charset="-128"/>
-                <a:sym typeface="Gill Sans" pitchFamily="-84" charset="0"/>
-              </a:defRPr>
-            </a:lvl8pPr>
-            <a:lvl9pPr marL="3886200" indent="-228600" algn="ctr" eaLnBrk="0" fontAlgn="base" hangingPunct="0">
-              <a:spcBef>
-                <a:spcPct val="0"/>
-              </a:spcBef>
-              <a:spcAft>
-                <a:spcPct val="0"/>
-              </a:spcAft>
-              <a:defRPr sz="3800">
-                <a:solidFill>
-                  <a:srgbClr val="000000"/>
-                </a:solidFill>
-                <a:latin typeface="Gill Sans" pitchFamily="-84" charset="0"/>
-                <a:ea typeface="ヒラギノ角ゴ ProN W3" pitchFamily="-84" charset="-128"/>
-                <a:sym typeface="Gill Sans" pitchFamily="-84" charset="0"/>
-              </a:defRPr>
-            </a:lvl9pPr>
-          </a:lstStyle>
-          <a:p>
-            <a:pPr eaLnBrk="1" hangingPunct="1"/>
-            <a:r>
-              <a:rPr lang="en-US" altLang="en-US">
-                <a:solidFill>
-                  <a:schemeClr val="tx1"/>
-                </a:solidFill>
-                <a:latin typeface="Helvetica" panose="020B0604020202020204" pitchFamily="34" charset="0"/>
-                <a:ea typeface="ＭＳ Ｐゴシック" pitchFamily="-84" charset="-128"/>
-                <a:sym typeface="Helvetica" panose="020B0604020202020204" pitchFamily="34" charset="0"/>
-              </a:rPr>
-              <a:t>7</a:t>
-            </a:r>
-          </a:p>
-        </p:txBody>
-      </p:sp>
-      <p:sp>
-        <p:nvSpPr>
-          <p:cNvPr id="22" name="Rectangle 18"/>
-          <p:cNvSpPr>
-            <a:spLocks/>
-          </p:cNvSpPr>
-          <p:nvPr/>
-        </p:nvSpPr>
-        <p:spPr bwMode="auto">
-          <a:xfrm>
-            <a:off x="5384800" y="3644900"/>
-            <a:ext cx="357188" cy="660400"/>
-          </a:xfrm>
-          <a:prstGeom prst="rect">
-            <a:avLst/>
-          </a:prstGeom>
-          <a:noFill/>
-          <a:ln>
-            <a:noFill/>
-          </a:ln>
-          <a:extLst>
-            <a:ext uri="{909E8E84-426E-40DD-AFC4-6F175D3DCCD1}">
-              <a14:hiddenFill xmlns:a14="http://schemas.microsoft.com/office/drawing/2010/main">
-                <a:solidFill>
-                  <a:srgbClr val="FFFFFF"/>
-                </a:solidFill>
-              </a14:hiddenFill>
-            </a:ext>
-            <a:ext uri="{91240B29-F687-4F45-9708-019B960494DF}">
-              <a14:hiddenLine xmlns:a14="http://schemas.microsoft.com/office/drawing/2010/main" w="12700">
-                <a:solidFill>
-                  <a:schemeClr val="tx1"/>
-                </a:solidFill>
-                <a:miter lim="800000"/>
-                <a:headEnd/>
-                <a:tailEnd/>
-              </a14:hiddenLine>
-            </a:ext>
-          </a:extLst>
-        </p:spPr>
-        <p:txBody>
-          <a:bodyPr wrap="none" lIns="0" tIns="0" rIns="0" bIns="0" anchor="ctr">
-            <a:spAutoFit/>
-          </a:bodyPr>
-          <a:lstStyle>
-            <a:lvl1pPr algn="ctr">
-              <a:defRPr sz="3800">
-                <a:solidFill>
-                  <a:srgbClr val="000000"/>
-                </a:solidFill>
-                <a:latin typeface="Gill Sans" pitchFamily="-84" charset="0"/>
-                <a:ea typeface="ヒラギノ角ゴ ProN W3" pitchFamily="-84" charset="-128"/>
-                <a:sym typeface="Gill Sans" pitchFamily="-84" charset="0"/>
-              </a:defRPr>
-            </a:lvl1pPr>
-            <a:lvl2pPr marL="742950" indent="-285750" algn="ctr">
-              <a:defRPr sz="3800">
-                <a:solidFill>
-                  <a:srgbClr val="000000"/>
-                </a:solidFill>
-                <a:latin typeface="Gill Sans" pitchFamily="-84" charset="0"/>
-                <a:ea typeface="ヒラギノ角ゴ ProN W3" pitchFamily="-84" charset="-128"/>
-                <a:sym typeface="Gill Sans" pitchFamily="-84" charset="0"/>
-              </a:defRPr>
-            </a:lvl2pPr>
-            <a:lvl3pPr marL="1143000" indent="-228600" algn="ctr">
-              <a:defRPr sz="3800">
-                <a:solidFill>
-                  <a:srgbClr val="000000"/>
-                </a:solidFill>
-                <a:latin typeface="Gill Sans" pitchFamily="-84" charset="0"/>
-                <a:ea typeface="ヒラギノ角ゴ ProN W3" pitchFamily="-84" charset="-128"/>
-                <a:sym typeface="Gill Sans" pitchFamily="-84" charset="0"/>
-              </a:defRPr>
-            </a:lvl3pPr>
-            <a:lvl4pPr marL="1600200" indent="-228600" algn="ctr">
-              <a:defRPr sz="3800">
-                <a:solidFill>
-                  <a:srgbClr val="000000"/>
-                </a:solidFill>
-                <a:latin typeface="Gill Sans" pitchFamily="-84" charset="0"/>
-                <a:ea typeface="ヒラギノ角ゴ ProN W3" pitchFamily="-84" charset="-128"/>
-                <a:sym typeface="Gill Sans" pitchFamily="-84" charset="0"/>
-              </a:defRPr>
-            </a:lvl4pPr>
-            <a:lvl5pPr marL="2057400" indent="-228600" algn="ctr">
-              <a:defRPr sz="3800">
-                <a:solidFill>
-                  <a:srgbClr val="000000"/>
-                </a:solidFill>
-                <a:latin typeface="Gill Sans" pitchFamily="-84" charset="0"/>
-                <a:ea typeface="ヒラギノ角ゴ ProN W3" pitchFamily="-84" charset="-128"/>
-                <a:sym typeface="Gill Sans" pitchFamily="-84" charset="0"/>
-              </a:defRPr>
-            </a:lvl5pPr>
-            <a:lvl6pPr marL="2514600" indent="-228600" algn="ctr" eaLnBrk="0" fontAlgn="base" hangingPunct="0">
-              <a:spcBef>
-                <a:spcPct val="0"/>
-              </a:spcBef>
-              <a:spcAft>
-                <a:spcPct val="0"/>
-              </a:spcAft>
-              <a:defRPr sz="3800">
-                <a:solidFill>
-                  <a:srgbClr val="000000"/>
-                </a:solidFill>
-                <a:latin typeface="Gill Sans" pitchFamily="-84" charset="0"/>
-                <a:ea typeface="ヒラギノ角ゴ ProN W3" pitchFamily="-84" charset="-128"/>
-                <a:sym typeface="Gill Sans" pitchFamily="-84" charset="0"/>
-              </a:defRPr>
-            </a:lvl6pPr>
-            <a:lvl7pPr marL="2971800" indent="-228600" algn="ctr" eaLnBrk="0" fontAlgn="base" hangingPunct="0">
-              <a:spcBef>
-                <a:spcPct val="0"/>
-              </a:spcBef>
-              <a:spcAft>
-                <a:spcPct val="0"/>
-              </a:spcAft>
-              <a:defRPr sz="3800">
-                <a:solidFill>
-                  <a:srgbClr val="000000"/>
-                </a:solidFill>
-                <a:latin typeface="Gill Sans" pitchFamily="-84" charset="0"/>
-                <a:ea typeface="ヒラギノ角ゴ ProN W3" pitchFamily="-84" charset="-128"/>
-                <a:sym typeface="Gill Sans" pitchFamily="-84" charset="0"/>
-              </a:defRPr>
-            </a:lvl7pPr>
-            <a:lvl8pPr marL="3429000" indent="-228600" algn="ctr" eaLnBrk="0" fontAlgn="base" hangingPunct="0">
-              <a:spcBef>
-                <a:spcPct val="0"/>
-              </a:spcBef>
-              <a:spcAft>
-                <a:spcPct val="0"/>
-              </a:spcAft>
-              <a:defRPr sz="3800">
-                <a:solidFill>
-                  <a:srgbClr val="000000"/>
-                </a:solidFill>
-                <a:latin typeface="Gill Sans" pitchFamily="-84" charset="0"/>
-                <a:ea typeface="ヒラギノ角ゴ ProN W3" pitchFamily="-84" charset="-128"/>
-                <a:sym typeface="Gill Sans" pitchFamily="-84" charset="0"/>
-              </a:defRPr>
-            </a:lvl8pPr>
-            <a:lvl9pPr marL="3886200" indent="-228600" algn="ctr" eaLnBrk="0" fontAlgn="base" hangingPunct="0">
-              <a:spcBef>
-                <a:spcPct val="0"/>
-              </a:spcBef>
-              <a:spcAft>
-                <a:spcPct val="0"/>
-              </a:spcAft>
-              <a:defRPr sz="3800">
-                <a:solidFill>
-                  <a:srgbClr val="000000"/>
-                </a:solidFill>
-                <a:latin typeface="Gill Sans" pitchFamily="-84" charset="0"/>
-                <a:ea typeface="ヒラギノ角ゴ ProN W3" pitchFamily="-84" charset="-128"/>
-                <a:sym typeface="Gill Sans" pitchFamily="-84" charset="0"/>
-              </a:defRPr>
-            </a:lvl9pPr>
-          </a:lstStyle>
-          <a:p>
-            <a:pPr eaLnBrk="1" hangingPunct="1"/>
-            <a:r>
-              <a:rPr lang="en-US" altLang="en-US">
-                <a:solidFill>
-                  <a:schemeClr val="tx1"/>
-                </a:solidFill>
-                <a:latin typeface="Helvetica" panose="020B0604020202020204" pitchFamily="34" charset="0"/>
-                <a:ea typeface="ＭＳ Ｐゴシック" pitchFamily="-84" charset="-128"/>
-                <a:sym typeface="Helvetica" panose="020B0604020202020204" pitchFamily="34" charset="0"/>
-              </a:rPr>
-              <a:t>6</a:t>
-            </a:r>
-          </a:p>
-        </p:txBody>
-      </p:sp>
-      <p:sp>
-        <p:nvSpPr>
-          <p:cNvPr id="23" name="Rectangle 19"/>
-          <p:cNvSpPr>
-            <a:spLocks/>
-          </p:cNvSpPr>
-          <p:nvPr/>
-        </p:nvSpPr>
-        <p:spPr bwMode="auto">
-          <a:xfrm>
-            <a:off x="3746500" y="4406900"/>
-            <a:ext cx="357188" cy="660400"/>
-          </a:xfrm>
-          <a:prstGeom prst="rect">
-            <a:avLst/>
-          </a:prstGeom>
-          <a:noFill/>
-          <a:ln>
-            <a:noFill/>
-          </a:ln>
-          <a:extLst>
-            <a:ext uri="{909E8E84-426E-40DD-AFC4-6F175D3DCCD1}">
-              <a14:hiddenFill xmlns:a14="http://schemas.microsoft.com/office/drawing/2010/main">
-                <a:solidFill>
-                  <a:srgbClr val="FFFFFF"/>
-                </a:solidFill>
-              </a14:hiddenFill>
-            </a:ext>
-            <a:ext uri="{91240B29-F687-4F45-9708-019B960494DF}">
-              <a14:hiddenLine xmlns:a14="http://schemas.microsoft.com/office/drawing/2010/main" w="12700">
-                <a:solidFill>
-                  <a:schemeClr val="tx1"/>
-                </a:solidFill>
-                <a:miter lim="800000"/>
-                <a:headEnd/>
-                <a:tailEnd/>
-              </a14:hiddenLine>
-            </a:ext>
-          </a:extLst>
-        </p:spPr>
-        <p:txBody>
-          <a:bodyPr wrap="none" lIns="0" tIns="0" rIns="0" bIns="0" anchor="ctr">
-            <a:spAutoFit/>
-          </a:bodyPr>
-          <a:lstStyle>
-            <a:lvl1pPr algn="ctr">
-              <a:defRPr sz="3800">
-                <a:solidFill>
-                  <a:srgbClr val="000000"/>
-                </a:solidFill>
-                <a:latin typeface="Gill Sans" pitchFamily="-84" charset="0"/>
-                <a:ea typeface="ヒラギノ角ゴ ProN W3" pitchFamily="-84" charset="-128"/>
-                <a:sym typeface="Gill Sans" pitchFamily="-84" charset="0"/>
-              </a:defRPr>
-            </a:lvl1pPr>
-            <a:lvl2pPr marL="742950" indent="-285750" algn="ctr">
-              <a:defRPr sz="3800">
-                <a:solidFill>
-                  <a:srgbClr val="000000"/>
-                </a:solidFill>
-                <a:latin typeface="Gill Sans" pitchFamily="-84" charset="0"/>
-                <a:ea typeface="ヒラギノ角ゴ ProN W3" pitchFamily="-84" charset="-128"/>
-                <a:sym typeface="Gill Sans" pitchFamily="-84" charset="0"/>
-              </a:defRPr>
-            </a:lvl2pPr>
-            <a:lvl3pPr marL="1143000" indent="-228600" algn="ctr">
-              <a:defRPr sz="3800">
-                <a:solidFill>
-                  <a:srgbClr val="000000"/>
-                </a:solidFill>
-                <a:latin typeface="Gill Sans" pitchFamily="-84" charset="0"/>
-                <a:ea typeface="ヒラギノ角ゴ ProN W3" pitchFamily="-84" charset="-128"/>
-                <a:sym typeface="Gill Sans" pitchFamily="-84" charset="0"/>
-              </a:defRPr>
-            </a:lvl3pPr>
-            <a:lvl4pPr marL="1600200" indent="-228600" algn="ctr">
-              <a:defRPr sz="3800">
-                <a:solidFill>
-                  <a:srgbClr val="000000"/>
-                </a:solidFill>
-                <a:latin typeface="Gill Sans" pitchFamily="-84" charset="0"/>
-                <a:ea typeface="ヒラギノ角ゴ ProN W3" pitchFamily="-84" charset="-128"/>
-                <a:sym typeface="Gill Sans" pitchFamily="-84" charset="0"/>
-              </a:defRPr>
-            </a:lvl4pPr>
-            <a:lvl5pPr marL="2057400" indent="-228600" algn="ctr">
-              <a:defRPr sz="3800">
-                <a:solidFill>
-                  <a:srgbClr val="000000"/>
-                </a:solidFill>
-                <a:latin typeface="Gill Sans" pitchFamily="-84" charset="0"/>
-                <a:ea typeface="ヒラギノ角ゴ ProN W3" pitchFamily="-84" charset="-128"/>
-                <a:sym typeface="Gill Sans" pitchFamily="-84" charset="0"/>
-              </a:defRPr>
-            </a:lvl5pPr>
-            <a:lvl6pPr marL="2514600" indent="-228600" algn="ctr" eaLnBrk="0" fontAlgn="base" hangingPunct="0">
-              <a:spcBef>
-                <a:spcPct val="0"/>
-              </a:spcBef>
-              <a:spcAft>
-                <a:spcPct val="0"/>
-              </a:spcAft>
-              <a:defRPr sz="3800">
-                <a:solidFill>
-                  <a:srgbClr val="000000"/>
-                </a:solidFill>
-                <a:latin typeface="Gill Sans" pitchFamily="-84" charset="0"/>
-                <a:ea typeface="ヒラギノ角ゴ ProN W3" pitchFamily="-84" charset="-128"/>
-                <a:sym typeface="Gill Sans" pitchFamily="-84" charset="0"/>
-              </a:defRPr>
-            </a:lvl6pPr>
-            <a:lvl7pPr marL="2971800" indent="-228600" algn="ctr" eaLnBrk="0" fontAlgn="base" hangingPunct="0">
-              <a:spcBef>
-                <a:spcPct val="0"/>
-              </a:spcBef>
-              <a:spcAft>
-                <a:spcPct val="0"/>
-              </a:spcAft>
-              <a:defRPr sz="3800">
-                <a:solidFill>
-                  <a:srgbClr val="000000"/>
-                </a:solidFill>
-                <a:latin typeface="Gill Sans" pitchFamily="-84" charset="0"/>
-                <a:ea typeface="ヒラギノ角ゴ ProN W3" pitchFamily="-84" charset="-128"/>
-                <a:sym typeface="Gill Sans" pitchFamily="-84" charset="0"/>
-              </a:defRPr>
-            </a:lvl7pPr>
-            <a:lvl8pPr marL="3429000" indent="-228600" algn="ctr" eaLnBrk="0" fontAlgn="base" hangingPunct="0">
-              <a:spcBef>
-                <a:spcPct val="0"/>
-              </a:spcBef>
-              <a:spcAft>
-                <a:spcPct val="0"/>
-              </a:spcAft>
-              <a:defRPr sz="3800">
-                <a:solidFill>
-                  <a:srgbClr val="000000"/>
-                </a:solidFill>
-                <a:latin typeface="Gill Sans" pitchFamily="-84" charset="0"/>
-                <a:ea typeface="ヒラギノ角ゴ ProN W3" pitchFamily="-84" charset="-128"/>
-                <a:sym typeface="Gill Sans" pitchFamily="-84" charset="0"/>
-              </a:defRPr>
-            </a:lvl8pPr>
-            <a:lvl9pPr marL="3886200" indent="-228600" algn="ctr" eaLnBrk="0" fontAlgn="base" hangingPunct="0">
-              <a:spcBef>
-                <a:spcPct val="0"/>
-              </a:spcBef>
-              <a:spcAft>
-                <a:spcPct val="0"/>
-              </a:spcAft>
-              <a:defRPr sz="3800">
-                <a:solidFill>
-                  <a:srgbClr val="000000"/>
-                </a:solidFill>
-                <a:latin typeface="Gill Sans" pitchFamily="-84" charset="0"/>
-                <a:ea typeface="ヒラギノ角ゴ ProN W3" pitchFamily="-84" charset="-128"/>
-                <a:sym typeface="Gill Sans" pitchFamily="-84" charset="0"/>
-              </a:defRPr>
-            </a:lvl9pPr>
-          </a:lstStyle>
-          <a:p>
-            <a:pPr eaLnBrk="1" hangingPunct="1"/>
-            <a:r>
-              <a:rPr lang="en-US" altLang="en-US">
-                <a:solidFill>
-                  <a:schemeClr val="tx1"/>
-                </a:solidFill>
-                <a:latin typeface="Helvetica" panose="020B0604020202020204" pitchFamily="34" charset="0"/>
-                <a:ea typeface="ＭＳ Ｐゴシック" pitchFamily="-84" charset="-128"/>
-                <a:sym typeface="Helvetica" panose="020B0604020202020204" pitchFamily="34" charset="0"/>
-              </a:rPr>
-              <a:t>5</a:t>
-            </a:r>
+          <a:lstStyle/>
+          <a:p>
+            <a:r>
+              <a:rPr lang="en-US" dirty="0" smtClean="0"/>
+              <a:t>Image Courtesy - Wikipedia</a:t>
+            </a:r>
+            <a:endParaRPr lang="en-US" dirty="0"/>
           </a:p>
         </p:txBody>
       </p:sp>
@@ -18850,11 +16435,11 @@
   <p:clrMapOvr>
     <a:masterClrMapping/>
   </p:clrMapOvr>
-  <mc:AlternateContent xmlns:mc="http://schemas.openxmlformats.org/markup-compatibility/2006">
-    <mc:Choice xmlns:p14="http://schemas.microsoft.com/office/powerpoint/2010/main" Requires="p14">
+  <mc:AlternateContent xmlns:mc="http://schemas.openxmlformats.org/markup-compatibility/2006" xmlns:p14="http://schemas.microsoft.com/office/powerpoint/2010/main">
+    <mc:Choice Requires="p14">
       <p:transition spd="slow" p14:dur="2000" advTm="55457"/>
     </mc:Choice>
-    <mc:Fallback>
+    <mc:Fallback xmlns="">
       <p:transition spd="slow" advTm="55457"/>
     </mc:Fallback>
   </mc:AlternateContent>
@@ -20748,11 +18333,11 @@
   <p:clrMapOvr>
     <a:masterClrMapping/>
   </p:clrMapOvr>
-  <mc:AlternateContent xmlns:mc="http://schemas.openxmlformats.org/markup-compatibility/2006">
-    <mc:Choice xmlns:p14="http://schemas.microsoft.com/office/powerpoint/2010/main" Requires="p14">
+  <mc:AlternateContent xmlns:mc="http://schemas.openxmlformats.org/markup-compatibility/2006" xmlns:p14="http://schemas.microsoft.com/office/powerpoint/2010/main">
+    <mc:Choice Requires="p14">
       <p:transition spd="slow" p14:dur="2000" advTm="25422"/>
     </mc:Choice>
-    <mc:Fallback>
+    <mc:Fallback xmlns="">
       <p:transition spd="slow" advTm="25422"/>
     </mc:Fallback>
   </mc:AlternateContent>
@@ -23406,11 +20991,11 @@
   <p:clrMapOvr>
     <a:masterClrMapping/>
   </p:clrMapOvr>
-  <mc:AlternateContent xmlns:mc="http://schemas.openxmlformats.org/markup-compatibility/2006">
-    <mc:Choice xmlns:p14="http://schemas.microsoft.com/office/powerpoint/2010/main" Requires="p14">
+  <mc:AlternateContent xmlns:mc="http://schemas.openxmlformats.org/markup-compatibility/2006" xmlns:p14="http://schemas.microsoft.com/office/powerpoint/2010/main">
+    <mc:Choice Requires="p14">
       <p:transition spd="slow" p14:dur="2000" advTm="25136"/>
     </mc:Choice>
-    <mc:Fallback>
+    <mc:Fallback xmlns="">
       <p:transition spd="slow" advTm="25136"/>
     </mc:Fallback>
   </mc:AlternateContent>
@@ -26441,8 +24026,8 @@
         </p:nvSpPr>
         <p:spPr bwMode="auto">
           <a:xfrm>
-            <a:off x="4838918" y="5257284"/>
-            <a:ext cx="2580835" cy="369332"/>
+            <a:off x="4746745" y="5257284"/>
+            <a:ext cx="2765181" cy="369332"/>
           </a:xfrm>
           <a:prstGeom prst="rect">
             <a:avLst/>
@@ -26602,7 +24187,7 @@
                 <a:ea typeface="ＭＳ Ｐゴシック" pitchFamily="-84" charset="-128"/>
                 <a:sym typeface="Courier New Bold" panose="02070609020205020404" pitchFamily="49" charset="0"/>
               </a:rPr>
-              <a:t>Doctor_Patiens</a:t>
+              <a:t>Doctor_Patients</a:t>
             </a:r>
             <a:endParaRPr lang="en-US" altLang="en-US" sz="2400" dirty="0">
               <a:solidFill>
@@ -29304,6 +26889,36 @@
           </a:p>
         </p:txBody>
       </p:sp>
+      <p:sp>
+        <p:nvSpPr>
+          <p:cNvPr id="80" name="TextBox 79"/>
+          <p:cNvSpPr txBox="1"/>
+          <p:nvPr/>
+        </p:nvSpPr>
+        <p:spPr>
+          <a:xfrm>
+            <a:off x="9514497" y="6019800"/>
+            <a:ext cx="2437911" cy="369332"/>
+          </a:xfrm>
+          <a:prstGeom prst="rect">
+            <a:avLst/>
+          </a:prstGeom>
+          <a:noFill/>
+        </p:spPr>
+        <p:txBody>
+          <a:bodyPr wrap="none" rtlCol="0">
+            <a:spAutoFit/>
+          </a:bodyPr>
+          <a:lstStyle/>
+          <a:p>
+            <a:r>
+              <a:rPr lang="en-US" dirty="0" smtClean="0"/>
+              <a:t>Image Courtesy – Neo4J</a:t>
+            </a:r>
+            <a:endParaRPr lang="en-US" dirty="0"/>
+          </a:p>
+        </p:txBody>
+      </p:sp>
     </p:spTree>
     <p:extLst>
       <p:ext uri="{BB962C8B-B14F-4D97-AF65-F5344CB8AC3E}">
@@ -29314,11 +26929,11 @@
   <p:clrMapOvr>
     <a:masterClrMapping/>
   </p:clrMapOvr>
-  <mc:AlternateContent xmlns:mc="http://schemas.openxmlformats.org/markup-compatibility/2006">
-    <mc:Choice xmlns:p14="http://schemas.microsoft.com/office/powerpoint/2010/main" Requires="p14">
+  <mc:AlternateContent xmlns:mc="http://schemas.openxmlformats.org/markup-compatibility/2006" xmlns:p14="http://schemas.microsoft.com/office/powerpoint/2010/main">
+    <mc:Choice Requires="p14">
       <p:transition spd="slow" p14:dur="2000" advTm="6576"/>
     </mc:Choice>
-    <mc:Fallback>
+    <mc:Fallback xmlns="">
       <p:transition spd="slow" advTm="6576"/>
     </mc:Fallback>
   </mc:AlternateContent>
@@ -31711,6 +29326,36 @@
           </a:p>
         </p:txBody>
       </p:sp>
+      <p:sp>
+        <p:nvSpPr>
+          <p:cNvPr id="26" name="TextBox 25"/>
+          <p:cNvSpPr txBox="1"/>
+          <p:nvPr/>
+        </p:nvSpPr>
+        <p:spPr>
+          <a:xfrm>
+            <a:off x="9753600" y="6019800"/>
+            <a:ext cx="2437911" cy="369332"/>
+          </a:xfrm>
+          <a:prstGeom prst="rect">
+            <a:avLst/>
+          </a:prstGeom>
+          <a:noFill/>
+        </p:spPr>
+        <p:txBody>
+          <a:bodyPr wrap="none" rtlCol="0">
+            <a:spAutoFit/>
+          </a:bodyPr>
+          <a:lstStyle/>
+          <a:p>
+            <a:r>
+              <a:rPr lang="en-US" dirty="0" smtClean="0"/>
+              <a:t>Image Courtesy – Neo4J</a:t>
+            </a:r>
+            <a:endParaRPr lang="en-US" dirty="0"/>
+          </a:p>
+        </p:txBody>
+      </p:sp>
     </p:spTree>
     <p:extLst>
       <p:ext uri="{BB962C8B-B14F-4D97-AF65-F5344CB8AC3E}">
@@ -31721,11 +29366,11 @@
   <p:clrMapOvr>
     <a:masterClrMapping/>
   </p:clrMapOvr>
-  <mc:AlternateContent xmlns:mc="http://schemas.openxmlformats.org/markup-compatibility/2006">
-    <mc:Choice xmlns:p14="http://schemas.microsoft.com/office/powerpoint/2010/main" Requires="p14">
+  <mc:AlternateContent xmlns:mc="http://schemas.openxmlformats.org/markup-compatibility/2006" xmlns:p14="http://schemas.microsoft.com/office/powerpoint/2010/main">
+    <mc:Choice Requires="p14">
       <p:transition spd="slow" p14:dur="2000" advTm="692"/>
     </mc:Choice>
-    <mc:Fallback>
+    <mc:Fallback xmlns="">
       <p:transition spd="slow" advTm="692"/>
     </mc:Fallback>
   </mc:AlternateContent>

</xml_diff>